<commit_message>
Added new schematics and figures 	new file:   Figs/24hr_skymap.png 				- Added a 24Hr map 	new file:   Figs/Overall_arch_afaac.pptx 				- New overall architecture without calibration details. 	new file:   Figs/Overall_arch_afaac/Slide1.png 	new file:   Figs/afaac_ctrl_system.png 				- New control system blk diagram in consultation with Folkert. 	modified:   Figs/data_routing_transform_hierarchy.pptx 	modified:   Figs/data_routing_transform_hierarchy/Slide1.png 				- Updated diagram to replace antennas with dipoles, put boxes 				  around it. 	modified:   aartfaac_sys_design_jai.tex 				- Added new figures.
</commit_message>
<xml_diff>
--- a/Figs/data_routing_transform_hierarchy.pptx
+++ b/Figs/data_routing_transform_hierarchy.pptx
@@ -288,7 +288,7 @@
           <a:p>
             <a:fld id="{604D3159-D233-8E42-808D-1F1B63DDEA3F}" type="datetimeFigureOut">
               <a:rPr lang="en-US" smtClean="0"/>
-              <a:t>01/08/16</a:t>
+              <a:t>08/08/16</a:t>
             </a:fld>
             <a:endParaRPr lang="en-US"/>
           </a:p>
@@ -458,7 +458,7 @@
           <a:p>
             <a:fld id="{604D3159-D233-8E42-808D-1F1B63DDEA3F}" type="datetimeFigureOut">
               <a:rPr lang="en-US" smtClean="0"/>
-              <a:t>01/08/16</a:t>
+              <a:t>08/08/16</a:t>
             </a:fld>
             <a:endParaRPr lang="en-US"/>
           </a:p>
@@ -638,7 +638,7 @@
           <a:p>
             <a:fld id="{604D3159-D233-8E42-808D-1F1B63DDEA3F}" type="datetimeFigureOut">
               <a:rPr lang="en-US" smtClean="0"/>
-              <a:t>01/08/16</a:t>
+              <a:t>08/08/16</a:t>
             </a:fld>
             <a:endParaRPr lang="en-US"/>
           </a:p>
@@ -808,7 +808,7 @@
           <a:p>
             <a:fld id="{604D3159-D233-8E42-808D-1F1B63DDEA3F}" type="datetimeFigureOut">
               <a:rPr lang="en-US" smtClean="0"/>
-              <a:t>01/08/16</a:t>
+              <a:t>08/08/16</a:t>
             </a:fld>
             <a:endParaRPr lang="en-US"/>
           </a:p>
@@ -1054,7 +1054,7 @@
           <a:p>
             <a:fld id="{604D3159-D233-8E42-808D-1F1B63DDEA3F}" type="datetimeFigureOut">
               <a:rPr lang="en-US" smtClean="0"/>
-              <a:t>01/08/16</a:t>
+              <a:t>08/08/16</a:t>
             </a:fld>
             <a:endParaRPr lang="en-US"/>
           </a:p>
@@ -1342,7 +1342,7 @@
           <a:p>
             <a:fld id="{604D3159-D233-8E42-808D-1F1B63DDEA3F}" type="datetimeFigureOut">
               <a:rPr lang="en-US" smtClean="0"/>
-              <a:t>01/08/16</a:t>
+              <a:t>08/08/16</a:t>
             </a:fld>
             <a:endParaRPr lang="en-US"/>
           </a:p>
@@ -1769,7 +1769,7 @@
           <a:p>
             <a:fld id="{604D3159-D233-8E42-808D-1F1B63DDEA3F}" type="datetimeFigureOut">
               <a:rPr lang="en-US" smtClean="0"/>
-              <a:t>01/08/16</a:t>
+              <a:t>08/08/16</a:t>
             </a:fld>
             <a:endParaRPr lang="en-US"/>
           </a:p>
@@ -1887,7 +1887,7 @@
           <a:p>
             <a:fld id="{604D3159-D233-8E42-808D-1F1B63DDEA3F}" type="datetimeFigureOut">
               <a:rPr lang="en-US" smtClean="0"/>
-              <a:t>01/08/16</a:t>
+              <a:t>08/08/16</a:t>
             </a:fld>
             <a:endParaRPr lang="en-US"/>
           </a:p>
@@ -1982,7 +1982,7 @@
           <a:p>
             <a:fld id="{604D3159-D233-8E42-808D-1F1B63DDEA3F}" type="datetimeFigureOut">
               <a:rPr lang="en-US" smtClean="0"/>
-              <a:t>01/08/16</a:t>
+              <a:t>08/08/16</a:t>
             </a:fld>
             <a:endParaRPr lang="en-US"/>
           </a:p>
@@ -2259,7 +2259,7 @@
           <a:p>
             <a:fld id="{604D3159-D233-8E42-808D-1F1B63DDEA3F}" type="datetimeFigureOut">
               <a:rPr lang="en-US" smtClean="0"/>
-              <a:t>01/08/16</a:t>
+              <a:t>08/08/16</a:t>
             </a:fld>
             <a:endParaRPr lang="en-US"/>
           </a:p>
@@ -2512,7 +2512,7 @@
           <a:p>
             <a:fld id="{604D3159-D233-8E42-808D-1F1B63DDEA3F}" type="datetimeFigureOut">
               <a:rPr lang="en-US" smtClean="0"/>
-              <a:t>01/08/16</a:t>
+              <a:t>08/08/16</a:t>
             </a:fld>
             <a:endParaRPr lang="en-US"/>
           </a:p>
@@ -2725,7 +2725,7 @@
           <a:p>
             <a:fld id="{604D3159-D233-8E42-808D-1F1B63DDEA3F}" type="datetimeFigureOut">
               <a:rPr lang="en-US" smtClean="0"/>
-              <a:t>01/08/16</a:t>
+              <a:t>08/08/16</a:t>
             </a:fld>
             <a:endParaRPr lang="en-US"/>
           </a:p>
@@ -3246,7 +3246,7 @@
           <p:spPr>
             <a:xfrm>
               <a:off x="330563" y="487063"/>
-              <a:ext cx="1402948" cy="369332"/>
+              <a:ext cx="1390224" cy="369332"/>
             </a:xfrm>
             <a:prstGeom prst="rect">
               <a:avLst/>
@@ -3260,8 +3260,16 @@
             <a:lstStyle/>
             <a:p>
               <a:r>
+                <a:rPr lang="en-US" dirty="0"/>
+                <a:t>d</a:t>
+              </a:r>
+              <a:r>
                 <a:rPr lang="en-US" dirty="0" smtClean="0"/>
-                <a:t>A0,sb[0-35],t</a:t>
+                <a:t>0</a:t>
+              </a:r>
+              <a:r>
+                <a:rPr lang="en-US" dirty="0" smtClean="0"/>
+                <a:t>,sb[0-35],t</a:t>
               </a:r>
               <a:endParaRPr lang="en-US" dirty="0"/>
             </a:p>
@@ -3366,7 +3374,7 @@
           <p:spPr>
             <a:xfrm>
               <a:off x="330563" y="487063"/>
-              <a:ext cx="1402948" cy="369332"/>
+              <a:ext cx="1390224" cy="369332"/>
             </a:xfrm>
             <a:prstGeom prst="rect">
               <a:avLst/>
@@ -3380,8 +3388,16 @@
             <a:lstStyle/>
             <a:p>
               <a:r>
+                <a:rPr lang="en-US" dirty="0"/>
+                <a:t>d</a:t>
+              </a:r>
+              <a:r>
                 <a:rPr lang="en-US" dirty="0" smtClean="0"/>
-                <a:t>A7,sb[0-35],t</a:t>
+                <a:t>7</a:t>
+              </a:r>
+              <a:r>
+                <a:rPr lang="en-US" dirty="0" smtClean="0"/>
+                <a:t>,sb[0-35],t</a:t>
               </a:r>
               <a:endParaRPr lang="en-US" dirty="0"/>
             </a:p>
@@ -3705,7 +3721,7 @@
           <p:spPr>
             <a:xfrm>
               <a:off x="330563" y="487063"/>
-              <a:ext cx="1519504" cy="369332"/>
+              <a:ext cx="1507218" cy="369332"/>
             </a:xfrm>
             <a:prstGeom prst="rect">
               <a:avLst/>
@@ -3719,8 +3735,16 @@
             <a:lstStyle/>
             <a:p>
               <a:r>
+                <a:rPr lang="en-US" dirty="0"/>
+                <a:t>d</a:t>
+              </a:r>
+              <a:r>
                 <a:rPr lang="en-US" dirty="0" smtClean="0"/>
-                <a:t>A31,sb[0-35],t</a:t>
+                <a:t>31</a:t>
+              </a:r>
+              <a:r>
+                <a:rPr lang="en-US" dirty="0" smtClean="0"/>
+                <a:t>,sb[0-35],t</a:t>
               </a:r>
               <a:endParaRPr lang="en-US" dirty="0"/>
             </a:p>
@@ -4007,7 +4031,7 @@
           <p:spPr>
             <a:xfrm>
               <a:off x="330563" y="487063"/>
-              <a:ext cx="1736373" cy="369332"/>
+              <a:ext cx="1723549" cy="369332"/>
             </a:xfrm>
             <a:prstGeom prst="rect">
               <a:avLst/>
@@ -4021,12 +4045,28 @@
             <a:lstStyle/>
             <a:p>
               <a:r>
+                <a:rPr lang="en-US" dirty="0">
+                  <a:solidFill>
+                    <a:schemeClr val="accent6"/>
+                  </a:solidFill>
+                </a:rPr>
+                <a:t>d</a:t>
+              </a:r>
+              <a:r>
                 <a:rPr lang="en-US" dirty="0" smtClean="0">
                   <a:solidFill>
                     <a:schemeClr val="accent6"/>
                   </a:solidFill>
                 </a:rPr>
-                <a:t>A[0-31],sb[0-8],t</a:t>
+                <a:t>[</a:t>
+              </a:r>
+              <a:r>
+                <a:rPr lang="en-US" dirty="0" smtClean="0">
+                  <a:solidFill>
+                    <a:schemeClr val="accent6"/>
+                  </a:solidFill>
+                </a:rPr>
+                <a:t>0-31],sb[0-8],t</a:t>
               </a:r>
               <a:endParaRPr lang="en-US" dirty="0">
                 <a:solidFill>
@@ -4093,7 +4133,7 @@
           <p:spPr>
             <a:xfrm>
               <a:off x="330563" y="487063"/>
-              <a:ext cx="1851789" cy="369332"/>
+              <a:ext cx="1838965" cy="369332"/>
             </a:xfrm>
             <a:prstGeom prst="rect">
               <a:avLst/>
@@ -4107,8 +4147,16 @@
             <a:lstStyle/>
             <a:p>
               <a:r>
+                <a:rPr lang="en-US" dirty="0"/>
+                <a:t>d</a:t>
+              </a:r>
+              <a:r>
                 <a:rPr lang="en-US" dirty="0" smtClean="0"/>
-                <a:t>A[0-31],</a:t>
+                <a:t>[</a:t>
+              </a:r>
+              <a:r>
+                <a:rPr lang="en-US" dirty="0" smtClean="0"/>
+                <a:t>0-31],</a:t>
               </a:r>
               <a:r>
                 <a:rPr lang="en-US" dirty="0" err="1" smtClean="0"/>
@@ -4132,9 +4180,9 @@
         <p:grpSpPr>
           <a:xfrm>
             <a:off x="2875523" y="1605273"/>
-            <a:ext cx="1967205" cy="369332"/>
+            <a:ext cx="1954381" cy="369332"/>
             <a:chOff x="330563" y="487063"/>
-            <a:chExt cx="1967205" cy="369332"/>
+            <a:chExt cx="1954381" cy="369332"/>
           </a:xfrm>
         </p:grpSpPr>
         <p:cxnSp>
@@ -4179,7 +4227,7 @@
           <p:spPr>
             <a:xfrm>
               <a:off x="330563" y="487063"/>
-              <a:ext cx="1967205" cy="369332"/>
+              <a:ext cx="1954381" cy="369332"/>
             </a:xfrm>
             <a:prstGeom prst="rect">
               <a:avLst/>
@@ -4193,8 +4241,16 @@
             <a:lstStyle/>
             <a:p>
               <a:r>
+                <a:rPr lang="en-US" dirty="0"/>
+                <a:t>d</a:t>
+              </a:r>
+              <a:r>
                 <a:rPr lang="en-US" dirty="0" smtClean="0"/>
-                <a:t>A[0-31],</a:t>
+                <a:t>[</a:t>
+              </a:r>
+              <a:r>
+                <a:rPr lang="en-US" dirty="0" smtClean="0"/>
+                <a:t>0-31],</a:t>
               </a:r>
               <a:r>
                 <a:rPr lang="en-US" dirty="0" err="1" smtClean="0"/>
@@ -4218,9 +4274,9 @@
         <p:grpSpPr>
           <a:xfrm>
             <a:off x="2858125" y="2144518"/>
-            <a:ext cx="1967205" cy="369332"/>
+            <a:ext cx="1954381" cy="369332"/>
             <a:chOff x="330563" y="487063"/>
-            <a:chExt cx="1967205" cy="369332"/>
+            <a:chExt cx="1954381" cy="369332"/>
           </a:xfrm>
         </p:grpSpPr>
         <p:cxnSp>
@@ -4265,7 +4321,7 @@
           <p:spPr>
             <a:xfrm>
               <a:off x="330563" y="487063"/>
-              <a:ext cx="1967205" cy="369332"/>
+              <a:ext cx="1954381" cy="369332"/>
             </a:xfrm>
             <a:prstGeom prst="rect">
               <a:avLst/>
@@ -4279,8 +4335,16 @@
             <a:lstStyle/>
             <a:p>
               <a:r>
+                <a:rPr lang="en-US" dirty="0"/>
+                <a:t>d</a:t>
+              </a:r>
+              <a:r>
                 <a:rPr lang="en-US" dirty="0" smtClean="0"/>
-                <a:t>A[0-31],</a:t>
+                <a:t>[</a:t>
+              </a:r>
+              <a:r>
+                <a:rPr lang="en-US" dirty="0" smtClean="0"/>
+                <a:t>0-31],</a:t>
               </a:r>
               <a:r>
                 <a:rPr lang="en-US" dirty="0" err="1" smtClean="0"/>
@@ -4351,7 +4415,7 @@
           <p:spPr>
             <a:xfrm>
               <a:off x="330563" y="487063"/>
-              <a:ext cx="1851789" cy="369332"/>
+              <a:ext cx="1838965" cy="369332"/>
             </a:xfrm>
             <a:prstGeom prst="rect">
               <a:avLst/>
@@ -4365,12 +4429,28 @@
             <a:lstStyle/>
             <a:p>
               <a:r>
+                <a:rPr lang="en-US" dirty="0">
+                  <a:solidFill>
+                    <a:srgbClr val="F79646"/>
+                  </a:solidFill>
+                </a:rPr>
+                <a:t>d</a:t>
+              </a:r>
+              <a:r>
                 <a:rPr lang="en-US" dirty="0" smtClean="0">
                   <a:solidFill>
                     <a:srgbClr val="F79646"/>
                   </a:solidFill>
                 </a:rPr>
-                <a:t>A[32-63],</a:t>
+                <a:t>[</a:t>
+              </a:r>
+              <a:r>
+                <a:rPr lang="en-US" dirty="0" smtClean="0">
+                  <a:solidFill>
+                    <a:srgbClr val="F79646"/>
+                  </a:solidFill>
+                </a:rPr>
+                <a:t>32-63],</a:t>
               </a:r>
               <a:r>
                 <a:rPr lang="en-US" dirty="0" err="1" smtClean="0">
@@ -4453,7 +4533,7 @@
           <p:spPr>
             <a:xfrm>
               <a:off x="330563" y="487063"/>
-              <a:ext cx="1851789" cy="369332"/>
+              <a:ext cx="1838965" cy="369332"/>
             </a:xfrm>
             <a:prstGeom prst="rect">
               <a:avLst/>
@@ -4467,12 +4547,28 @@
             <a:lstStyle/>
             <a:p>
               <a:r>
+                <a:rPr lang="en-US" dirty="0">
+                  <a:solidFill>
+                    <a:srgbClr val="F79646"/>
+                  </a:solidFill>
+                </a:rPr>
+                <a:t>d</a:t>
+              </a:r>
+              <a:r>
                 <a:rPr lang="en-US" dirty="0" smtClean="0">
                   <a:solidFill>
                     <a:srgbClr val="F79646"/>
                   </a:solidFill>
                 </a:rPr>
-                <a:t>A[64-95],</a:t>
+                <a:t>[</a:t>
+              </a:r>
+              <a:r>
+                <a:rPr lang="en-US" dirty="0" smtClean="0">
+                  <a:solidFill>
+                    <a:srgbClr val="F79646"/>
+                  </a:solidFill>
+                </a:rPr>
+                <a:t>64-95],</a:t>
               </a:r>
               <a:r>
                 <a:rPr lang="en-US" dirty="0" err="1" smtClean="0">
@@ -4740,7 +4836,7 @@
           <p:spPr>
             <a:xfrm>
               <a:off x="330563" y="487063"/>
-              <a:ext cx="1519504" cy="369332"/>
+              <a:ext cx="1507218" cy="369332"/>
             </a:xfrm>
             <a:prstGeom prst="rect">
               <a:avLst/>
@@ -4754,8 +4850,16 @@
             <a:lstStyle/>
             <a:p>
               <a:r>
+                <a:rPr lang="en-US" dirty="0"/>
+                <a:t>d</a:t>
+              </a:r>
+              <a:r>
                 <a:rPr lang="en-US" dirty="0" smtClean="0"/>
-                <a:t>A95,sb[0-35],t</a:t>
+                <a:t>95</a:t>
+              </a:r>
+              <a:r>
+                <a:rPr lang="en-US" dirty="0" smtClean="0"/>
+                <a:t>,sb[0-35],t</a:t>
               </a:r>
               <a:endParaRPr lang="en-US" dirty="0"/>
             </a:p>
@@ -5137,7 +5241,7 @@
             <a:pPr algn="ctr"/>
             <a:r>
               <a:rPr lang="en-US" dirty="0" smtClean="0"/>
-              <a:t>INFINIBAND</a:t>
+              <a:t>ETH.SWITCH</a:t>
             </a:r>
             <a:endParaRPr lang="en-US" dirty="0"/>
           </a:p>
@@ -5199,7 +5303,7 @@
           <p:spPr>
             <a:xfrm>
               <a:off x="330563" y="487063"/>
-              <a:ext cx="1736373" cy="369332"/>
+              <a:ext cx="1723549" cy="369332"/>
             </a:xfrm>
             <a:prstGeom prst="rect">
               <a:avLst/>
@@ -5213,12 +5317,28 @@
             <a:lstStyle/>
             <a:p>
               <a:r>
+                <a:rPr lang="en-US" dirty="0">
+                  <a:solidFill>
+                    <a:schemeClr val="accent6"/>
+                  </a:solidFill>
+                </a:rPr>
+                <a:t>d</a:t>
+              </a:r>
+              <a:r>
                 <a:rPr lang="en-US" dirty="0" smtClean="0">
                   <a:solidFill>
                     <a:schemeClr val="accent6"/>
                   </a:solidFill>
                 </a:rPr>
-                <a:t>A[0-95],sb[0-7],t</a:t>
+                <a:t>[</a:t>
+              </a:r>
+              <a:r>
+                <a:rPr lang="en-US" dirty="0" smtClean="0">
+                  <a:solidFill>
+                    <a:schemeClr val="accent6"/>
+                  </a:solidFill>
+                </a:rPr>
+                <a:t>0-95],sb[0-7],t</a:t>
               </a:r>
               <a:endParaRPr lang="en-US" dirty="0">
                 <a:solidFill>
@@ -5489,7 +5609,7 @@
           <p:spPr>
             <a:xfrm>
               <a:off x="330563" y="487063"/>
-              <a:ext cx="1663837" cy="338554"/>
+              <a:ext cx="1652916" cy="338554"/>
             </a:xfrm>
             <a:prstGeom prst="rect">
               <a:avLst/>
@@ -5508,7 +5628,15 @@
                     <a:schemeClr val="accent6"/>
                   </a:solidFill>
                 </a:rPr>
-                <a:t>A[0-575],sb[0-7],t</a:t>
+                <a:t>d[</a:t>
+              </a:r>
+              <a:r>
+                <a:rPr lang="en-US" sz="1600" dirty="0" smtClean="0">
+                  <a:solidFill>
+                    <a:schemeClr val="accent6"/>
+                  </a:solidFill>
+                </a:rPr>
+                <a:t>0-575],sb[0-7],t</a:t>
               </a:r>
               <a:endParaRPr lang="en-US" sz="1600" dirty="0">
                 <a:solidFill>
@@ -5528,9 +5656,9 @@
         <p:grpSpPr>
           <a:xfrm>
             <a:off x="7151375" y="1256908"/>
-            <a:ext cx="1975821" cy="369332"/>
+            <a:ext cx="1964901" cy="369332"/>
             <a:chOff x="330563" y="487063"/>
-            <a:chExt cx="1975821" cy="369332"/>
+            <a:chExt cx="1964901" cy="369332"/>
           </a:xfrm>
         </p:grpSpPr>
         <p:cxnSp>
@@ -5575,7 +5703,7 @@
           <p:spPr>
             <a:xfrm>
               <a:off x="330563" y="487063"/>
-              <a:ext cx="1975821" cy="338554"/>
+              <a:ext cx="1964901" cy="338554"/>
             </a:xfrm>
             <a:prstGeom prst="rect">
               <a:avLst/>
@@ -5589,12 +5717,28 @@
             <a:lstStyle/>
             <a:p>
               <a:r>
+                <a:rPr lang="en-US" sz="1600" dirty="0">
+                  <a:solidFill>
+                    <a:schemeClr val="accent6"/>
+                  </a:solidFill>
+                </a:rPr>
+                <a:t>d</a:t>
+              </a:r>
+              <a:r>
                 <a:rPr lang="en-US" sz="1600" dirty="0" smtClean="0">
                   <a:solidFill>
                     <a:schemeClr val="accent6"/>
                   </a:solidFill>
                 </a:rPr>
-                <a:t>A[576-1151],sb[0-7],t</a:t>
+                <a:t>[</a:t>
+              </a:r>
+              <a:r>
+                <a:rPr lang="en-US" sz="1600" dirty="0" smtClean="0">
+                  <a:solidFill>
+                    <a:schemeClr val="accent6"/>
+                  </a:solidFill>
+                </a:rPr>
+                <a:t>576-1151],sb[0-7],t</a:t>
               </a:r>
               <a:endParaRPr lang="en-US" sz="1600" dirty="0">
                 <a:solidFill>
@@ -5614,9 +5758,9 @@
         <p:grpSpPr>
           <a:xfrm>
             <a:off x="7151375" y="2315368"/>
-            <a:ext cx="1967205" cy="369332"/>
+            <a:ext cx="1954381" cy="369332"/>
             <a:chOff x="330563" y="487063"/>
-            <a:chExt cx="1967205" cy="369332"/>
+            <a:chExt cx="1954381" cy="369332"/>
           </a:xfrm>
         </p:grpSpPr>
         <p:cxnSp>
@@ -5661,7 +5805,7 @@
           <p:spPr>
             <a:xfrm>
               <a:off x="330563" y="487063"/>
-              <a:ext cx="1967205" cy="369332"/>
+              <a:ext cx="1954381" cy="369332"/>
             </a:xfrm>
             <a:prstGeom prst="rect">
               <a:avLst/>
@@ -5675,12 +5819,28 @@
             <a:lstStyle/>
             <a:p>
               <a:r>
+                <a:rPr lang="en-US" dirty="0">
+                  <a:solidFill>
+                    <a:schemeClr val="accent6"/>
+                  </a:solidFill>
+                </a:rPr>
+                <a:t>d</a:t>
+              </a:r>
+              <a:r>
                 <a:rPr lang="en-US" dirty="0" smtClean="0">
                   <a:solidFill>
                     <a:schemeClr val="accent6"/>
                   </a:solidFill>
                 </a:rPr>
-                <a:t>A[0-575],</a:t>
+                <a:t>[</a:t>
+              </a:r>
+              <a:r>
+                <a:rPr lang="en-US" dirty="0" smtClean="0">
+                  <a:solidFill>
+                    <a:schemeClr val="accent6"/>
+                  </a:solidFill>
+                </a:rPr>
+                <a:t>0-575],</a:t>
               </a:r>
               <a:r>
                 <a:rPr lang="en-US" dirty="0" err="1" smtClean="0">
@@ -5716,9 +5876,9 @@
         <p:grpSpPr>
           <a:xfrm>
             <a:off x="7145033" y="2996998"/>
-            <a:ext cx="2316710" cy="369332"/>
+            <a:ext cx="2304425" cy="369332"/>
             <a:chOff x="330563" y="487063"/>
-            <a:chExt cx="2316710" cy="369332"/>
+            <a:chExt cx="2304425" cy="369332"/>
           </a:xfrm>
         </p:grpSpPr>
         <p:cxnSp>
@@ -5763,7 +5923,7 @@
           <p:spPr>
             <a:xfrm>
               <a:off x="330563" y="487063"/>
-              <a:ext cx="2316710" cy="369332"/>
+              <a:ext cx="2304425" cy="369332"/>
             </a:xfrm>
             <a:prstGeom prst="rect">
               <a:avLst/>
@@ -5777,12 +5937,28 @@
             <a:lstStyle/>
             <a:p>
               <a:r>
+                <a:rPr lang="en-US" dirty="0">
+                  <a:solidFill>
+                    <a:schemeClr val="accent6"/>
+                  </a:solidFill>
+                </a:rPr>
+                <a:t>d</a:t>
+              </a:r>
+              <a:r>
                 <a:rPr lang="en-US" dirty="0" smtClean="0">
                   <a:solidFill>
                     <a:schemeClr val="accent6"/>
                   </a:solidFill>
                 </a:rPr>
-                <a:t>A[576-1151],</a:t>
+                <a:t>[</a:t>
+              </a:r>
+              <a:r>
+                <a:rPr lang="en-US" dirty="0" smtClean="0">
+                  <a:solidFill>
+                    <a:schemeClr val="accent6"/>
+                  </a:solidFill>
+                </a:rPr>
+                <a:t>576-1151],</a:t>
               </a:r>
               <a:r>
                 <a:rPr lang="en-US" dirty="0" err="1" smtClean="0">
@@ -7065,8 +7241,8 @@
         </p:nvSpPr>
         <p:spPr>
           <a:xfrm rot="16200000">
-            <a:off x="4479212" y="5104718"/>
-            <a:ext cx="2160041" cy="369332"/>
+            <a:off x="4524015" y="5104718"/>
+            <a:ext cx="2070436" cy="369332"/>
           </a:xfrm>
           <a:prstGeom prst="rect">
             <a:avLst/>
@@ -7093,7 +7269,23 @@
                   <a:srgbClr val="0000FF"/>
                 </a:solidFill>
               </a:rPr>
-              <a:t>[8-15],A[0-1151]</a:t>
+              <a:t>[8-15</a:t>
+            </a:r>
+            <a:r>
+              <a:rPr lang="en-US" dirty="0" smtClean="0">
+                <a:solidFill>
+                  <a:srgbClr val="0000FF"/>
+                </a:solidFill>
+              </a:rPr>
+              <a:t>],d[</a:t>
+            </a:r>
+            <a:r>
+              <a:rPr lang="en-US" dirty="0" smtClean="0">
+                <a:solidFill>
+                  <a:srgbClr val="0000FF"/>
+                </a:solidFill>
+              </a:rPr>
+              <a:t>0-1151]</a:t>
             </a:r>
             <a:endParaRPr lang="en-US" dirty="0">
               <a:solidFill>
@@ -8008,7 +8200,7 @@
         <p:spPr>
           <a:xfrm>
             <a:off x="3947460" y="4143650"/>
-            <a:ext cx="435223" cy="369332"/>
+            <a:ext cx="422937" cy="369332"/>
           </a:xfrm>
           <a:prstGeom prst="rect">
             <a:avLst/>
@@ -8022,8 +8214,12 @@
           <a:lstStyle/>
           <a:p>
             <a:r>
+              <a:rPr lang="en-US" dirty="0"/>
+              <a:t>d</a:t>
+            </a:r>
+            <a:r>
               <a:rPr lang="en-US" dirty="0" smtClean="0"/>
-              <a:t>A0</a:t>
+              <a:t>0</a:t>
             </a:r>
             <a:endParaRPr lang="en-US" dirty="0"/>
           </a:p>
@@ -8038,7 +8234,7 @@
         <p:spPr>
           <a:xfrm>
             <a:off x="3882248" y="4698481"/>
-            <a:ext cx="435223" cy="369332"/>
+            <a:ext cx="422937" cy="369332"/>
           </a:xfrm>
           <a:prstGeom prst="rect">
             <a:avLst/>
@@ -8052,8 +8248,12 @@
           <a:lstStyle/>
           <a:p>
             <a:r>
+              <a:rPr lang="en-US" dirty="0"/>
+              <a:t>d</a:t>
+            </a:r>
+            <a:r>
               <a:rPr lang="en-US" dirty="0" smtClean="0"/>
-              <a:t>A1</a:t>
+              <a:t>1</a:t>
             </a:r>
             <a:endParaRPr lang="en-US" dirty="0"/>
           </a:p>
@@ -8068,7 +8268,7 @@
         <p:spPr>
           <a:xfrm>
             <a:off x="3425581" y="5686986"/>
-            <a:ext cx="786205" cy="369332"/>
+            <a:ext cx="773920" cy="369332"/>
           </a:xfrm>
           <a:prstGeom prst="rect">
             <a:avLst/>
@@ -8082,8 +8282,12 @@
           <a:lstStyle/>
           <a:p>
             <a:r>
+              <a:rPr lang="en-US" dirty="0"/>
+              <a:t>d</a:t>
+            </a:r>
+            <a:r>
               <a:rPr lang="en-US" dirty="0" smtClean="0"/>
-              <a:t>A1151</a:t>
+              <a:t>1151</a:t>
             </a:r>
             <a:endParaRPr lang="en-US" dirty="0"/>
           </a:p>
@@ -8136,6 +8340,579 @@
           <a:xfrm flipH="1">
             <a:off x="6095185" y="4016066"/>
             <a:ext cx="166434" cy="481497"/>
+          </a:xfrm>
+          <a:prstGeom prst="straightConnector1">
+            <a:avLst/>
+          </a:prstGeom>
+          <a:ln>
+            <a:tailEnd type="arrow"/>
+          </a:ln>
+        </p:spPr>
+        <p:style>
+          <a:lnRef idx="2">
+            <a:schemeClr val="accent1"/>
+          </a:lnRef>
+          <a:fillRef idx="0">
+            <a:schemeClr val="accent1"/>
+          </a:fillRef>
+          <a:effectRef idx="1">
+            <a:schemeClr val="accent1"/>
+          </a:effectRef>
+          <a:fontRef idx="minor">
+            <a:schemeClr val="tx1"/>
+          </a:fontRef>
+        </p:style>
+      </p:cxnSp>
+      <p:sp>
+        <p:nvSpPr>
+          <p:cNvPr id="154" name="Rectangle 153"/>
+          <p:cNvSpPr/>
+          <p:nvPr/>
+        </p:nvSpPr>
+        <p:spPr>
+          <a:xfrm>
+            <a:off x="9072260" y="2495674"/>
+            <a:ext cx="791906" cy="1010080"/>
+          </a:xfrm>
+          <a:prstGeom prst="rect">
+            <a:avLst/>
+          </a:prstGeom>
+          <a:solidFill>
+            <a:schemeClr val="bg1">
+              <a:lumMod val="65000"/>
+              <a:alpha val="34000"/>
+            </a:schemeClr>
+          </a:solidFill>
+        </p:spPr>
+        <p:style>
+          <a:lnRef idx="1">
+            <a:schemeClr val="accent1"/>
+          </a:lnRef>
+          <a:fillRef idx="3">
+            <a:schemeClr val="accent1"/>
+          </a:fillRef>
+          <a:effectRef idx="2">
+            <a:schemeClr val="accent1"/>
+          </a:effectRef>
+          <a:fontRef idx="minor">
+            <a:schemeClr val="lt1"/>
+          </a:fontRef>
+        </p:style>
+        <p:txBody>
+          <a:bodyPr rtlCol="0" anchor="ctr"/>
+          <a:lstStyle/>
+          <a:p>
+            <a:pPr algn="ctr"/>
+            <a:r>
+              <a:rPr lang="en-US" dirty="0" smtClean="0"/>
+              <a:t>Corr1</a:t>
+            </a:r>
+            <a:endParaRPr lang="en-US" dirty="0"/>
+          </a:p>
+        </p:txBody>
+      </p:sp>
+      <p:cxnSp>
+        <p:nvCxnSpPr>
+          <p:cNvPr id="27" name="Straight Connector 26"/>
+          <p:cNvCxnSpPr>
+            <a:endCxn id="94" idx="3"/>
+          </p:cNvCxnSpPr>
+          <p:nvPr/>
+        </p:nvCxnSpPr>
+        <p:spPr>
+          <a:xfrm flipV="1">
+            <a:off x="4288023" y="2500034"/>
+            <a:ext cx="4817733" cy="1337289"/>
+          </a:xfrm>
+          <a:prstGeom prst="line">
+            <a:avLst/>
+          </a:prstGeom>
+          <a:ln w="6350">
+            <a:solidFill>
+              <a:schemeClr val="accent1">
+                <a:alpha val="30000"/>
+              </a:schemeClr>
+            </a:solidFill>
+            <a:prstDash val="lgDash"/>
+          </a:ln>
+        </p:spPr>
+        <p:style>
+          <a:lnRef idx="2">
+            <a:schemeClr val="accent1"/>
+          </a:lnRef>
+          <a:fillRef idx="0">
+            <a:schemeClr val="accent1"/>
+          </a:fillRef>
+          <a:effectRef idx="1">
+            <a:schemeClr val="accent1"/>
+          </a:effectRef>
+          <a:fontRef idx="minor">
+            <a:schemeClr val="tx1"/>
+          </a:fontRef>
+        </p:style>
+      </p:cxnSp>
+      <p:cxnSp>
+        <p:nvCxnSpPr>
+          <p:cNvPr id="156" name="Straight Connector 155"/>
+          <p:cNvCxnSpPr/>
+          <p:nvPr/>
+        </p:nvCxnSpPr>
+        <p:spPr>
+          <a:xfrm flipV="1">
+            <a:off x="8367059" y="2495674"/>
+            <a:ext cx="1434353" cy="1364482"/>
+          </a:xfrm>
+          <a:prstGeom prst="line">
+            <a:avLst/>
+          </a:prstGeom>
+          <a:ln w="6350">
+            <a:solidFill>
+              <a:schemeClr val="accent1">
+                <a:alpha val="30000"/>
+              </a:schemeClr>
+            </a:solidFill>
+            <a:prstDash val="lgDash"/>
+          </a:ln>
+        </p:spPr>
+        <p:style>
+          <a:lnRef idx="2">
+            <a:schemeClr val="accent1"/>
+          </a:lnRef>
+          <a:fillRef idx="0">
+            <a:schemeClr val="accent1"/>
+          </a:fillRef>
+          <a:effectRef idx="1">
+            <a:schemeClr val="accent1"/>
+          </a:effectRef>
+          <a:fontRef idx="minor">
+            <a:schemeClr val="tx1"/>
+          </a:fontRef>
+        </p:style>
+      </p:cxnSp>
+      <p:cxnSp>
+        <p:nvCxnSpPr>
+          <p:cNvPr id="159" name="Straight Connector 158"/>
+          <p:cNvCxnSpPr/>
+          <p:nvPr/>
+        </p:nvCxnSpPr>
+        <p:spPr>
+          <a:xfrm flipV="1">
+            <a:off x="8367059" y="3505754"/>
+            <a:ext cx="1497107" cy="3352247"/>
+          </a:xfrm>
+          <a:prstGeom prst="line">
+            <a:avLst/>
+          </a:prstGeom>
+          <a:ln w="6350">
+            <a:solidFill>
+              <a:schemeClr val="accent1">
+                <a:alpha val="30000"/>
+              </a:schemeClr>
+            </a:solidFill>
+            <a:prstDash val="lgDash"/>
+          </a:ln>
+        </p:spPr>
+        <p:style>
+          <a:lnRef idx="2">
+            <a:schemeClr val="accent1"/>
+          </a:lnRef>
+          <a:fillRef idx="0">
+            <a:schemeClr val="accent1"/>
+          </a:fillRef>
+          <a:effectRef idx="1">
+            <a:schemeClr val="accent1"/>
+          </a:effectRef>
+          <a:fontRef idx="minor">
+            <a:schemeClr val="tx1"/>
+          </a:fontRef>
+        </p:style>
+      </p:cxnSp>
+      <p:sp>
+        <p:nvSpPr>
+          <p:cNvPr id="55" name="Rounded Rectangle 54"/>
+          <p:cNvSpPr/>
+          <p:nvPr/>
+        </p:nvSpPr>
+        <p:spPr>
+          <a:xfrm>
+            <a:off x="231027" y="487063"/>
+            <a:ext cx="4963163" cy="3373093"/>
+          </a:xfrm>
+          <a:prstGeom prst="roundRect">
+            <a:avLst>
+              <a:gd name="adj" fmla="val 10466"/>
+            </a:avLst>
+          </a:prstGeom>
+          <a:solidFill>
+            <a:schemeClr val="accent3">
+              <a:lumMod val="40000"/>
+              <a:lumOff val="60000"/>
+              <a:alpha val="20000"/>
+            </a:schemeClr>
+          </a:solidFill>
+          <a:ln>
+            <a:solidFill>
+              <a:schemeClr val="accent3">
+                <a:lumMod val="75000"/>
+                <a:alpha val="8000"/>
+              </a:schemeClr>
+            </a:solidFill>
+          </a:ln>
+        </p:spPr>
+        <p:style>
+          <a:lnRef idx="1">
+            <a:schemeClr val="accent1"/>
+          </a:lnRef>
+          <a:fillRef idx="3">
+            <a:schemeClr val="accent1"/>
+          </a:fillRef>
+          <a:effectRef idx="2">
+            <a:schemeClr val="accent1"/>
+          </a:effectRef>
+          <a:fontRef idx="minor">
+            <a:schemeClr val="lt1"/>
+          </a:fontRef>
+        </p:style>
+        <p:txBody>
+          <a:bodyPr rtlCol="0" anchor="ctr"/>
+          <a:lstStyle/>
+          <a:p>
+            <a:pPr algn="ctr"/>
+            <a:endParaRPr lang="en-US"/>
+          </a:p>
+        </p:txBody>
+      </p:sp>
+      <p:sp>
+        <p:nvSpPr>
+          <p:cNvPr id="164" name="Rounded Rectangle 163"/>
+          <p:cNvSpPr/>
+          <p:nvPr/>
+        </p:nvSpPr>
+        <p:spPr>
+          <a:xfrm>
+            <a:off x="5494553" y="1067637"/>
+            <a:ext cx="1017453" cy="469334"/>
+          </a:xfrm>
+          <a:prstGeom prst="roundRect">
+            <a:avLst>
+              <a:gd name="adj" fmla="val 10466"/>
+            </a:avLst>
+          </a:prstGeom>
+          <a:solidFill>
+            <a:schemeClr val="accent3">
+              <a:lumMod val="40000"/>
+              <a:lumOff val="60000"/>
+              <a:alpha val="20000"/>
+            </a:schemeClr>
+          </a:solidFill>
+          <a:ln>
+            <a:solidFill>
+              <a:schemeClr val="accent3">
+                <a:lumMod val="75000"/>
+                <a:alpha val="8000"/>
+              </a:schemeClr>
+            </a:solidFill>
+          </a:ln>
+        </p:spPr>
+        <p:style>
+          <a:lnRef idx="1">
+            <a:schemeClr val="accent1"/>
+          </a:lnRef>
+          <a:fillRef idx="3">
+            <a:schemeClr val="accent1"/>
+          </a:fillRef>
+          <a:effectRef idx="2">
+            <a:schemeClr val="accent1"/>
+          </a:effectRef>
+          <a:fontRef idx="minor">
+            <a:schemeClr val="lt1"/>
+          </a:fontRef>
+        </p:style>
+        <p:txBody>
+          <a:bodyPr rtlCol="0" anchor="ctr"/>
+          <a:lstStyle/>
+          <a:p>
+            <a:pPr algn="ctr"/>
+            <a:endParaRPr lang="en-US"/>
+          </a:p>
+        </p:txBody>
+      </p:sp>
+      <p:sp>
+        <p:nvSpPr>
+          <p:cNvPr id="167" name="Rounded Rectangle 166"/>
+          <p:cNvSpPr/>
+          <p:nvPr/>
+        </p:nvSpPr>
+        <p:spPr>
+          <a:xfrm>
+            <a:off x="5512484" y="1772854"/>
+            <a:ext cx="1017453" cy="469334"/>
+          </a:xfrm>
+          <a:prstGeom prst="roundRect">
+            <a:avLst>
+              <a:gd name="adj" fmla="val 10466"/>
+            </a:avLst>
+          </a:prstGeom>
+          <a:solidFill>
+            <a:schemeClr val="accent3">
+              <a:lumMod val="40000"/>
+              <a:lumOff val="60000"/>
+              <a:alpha val="20000"/>
+            </a:schemeClr>
+          </a:solidFill>
+          <a:ln>
+            <a:solidFill>
+              <a:schemeClr val="accent3">
+                <a:lumMod val="75000"/>
+                <a:alpha val="8000"/>
+              </a:schemeClr>
+            </a:solidFill>
+          </a:ln>
+        </p:spPr>
+        <p:style>
+          <a:lnRef idx="1">
+            <a:schemeClr val="accent1"/>
+          </a:lnRef>
+          <a:fillRef idx="3">
+            <a:schemeClr val="accent1"/>
+          </a:fillRef>
+          <a:effectRef idx="2">
+            <a:schemeClr val="accent1"/>
+          </a:effectRef>
+          <a:fontRef idx="minor">
+            <a:schemeClr val="lt1"/>
+          </a:fontRef>
+        </p:style>
+        <p:txBody>
+          <a:bodyPr rtlCol="0" anchor="ctr"/>
+          <a:lstStyle/>
+          <a:p>
+            <a:pPr algn="ctr"/>
+            <a:endParaRPr lang="en-US"/>
+          </a:p>
+        </p:txBody>
+      </p:sp>
+      <p:sp>
+        <p:nvSpPr>
+          <p:cNvPr id="168" name="Rounded Rectangle 167"/>
+          <p:cNvSpPr/>
+          <p:nvPr/>
+        </p:nvSpPr>
+        <p:spPr>
+          <a:xfrm>
+            <a:off x="5515474" y="2358543"/>
+            <a:ext cx="1017453" cy="469334"/>
+          </a:xfrm>
+          <a:prstGeom prst="roundRect">
+            <a:avLst>
+              <a:gd name="adj" fmla="val 10466"/>
+            </a:avLst>
+          </a:prstGeom>
+          <a:solidFill>
+            <a:schemeClr val="accent3">
+              <a:lumMod val="40000"/>
+              <a:lumOff val="60000"/>
+              <a:alpha val="20000"/>
+            </a:schemeClr>
+          </a:solidFill>
+          <a:ln>
+            <a:solidFill>
+              <a:schemeClr val="accent3">
+                <a:lumMod val="75000"/>
+                <a:alpha val="8000"/>
+              </a:schemeClr>
+            </a:solidFill>
+          </a:ln>
+        </p:spPr>
+        <p:style>
+          <a:lnRef idx="1">
+            <a:schemeClr val="accent1"/>
+          </a:lnRef>
+          <a:fillRef idx="3">
+            <a:schemeClr val="accent1"/>
+          </a:fillRef>
+          <a:effectRef idx="2">
+            <a:schemeClr val="accent1"/>
+          </a:effectRef>
+          <a:fontRef idx="minor">
+            <a:schemeClr val="lt1"/>
+          </a:fontRef>
+        </p:style>
+        <p:txBody>
+          <a:bodyPr rtlCol="0" anchor="ctr"/>
+          <a:lstStyle/>
+          <a:p>
+            <a:pPr algn="ctr"/>
+            <a:endParaRPr lang="en-US"/>
+          </a:p>
+        </p:txBody>
+      </p:sp>
+      <p:sp>
+        <p:nvSpPr>
+          <p:cNvPr id="169" name="Rounded Rectangle 168"/>
+          <p:cNvSpPr/>
+          <p:nvPr/>
+        </p:nvSpPr>
+        <p:spPr>
+          <a:xfrm>
+            <a:off x="5533405" y="3093642"/>
+            <a:ext cx="1017453" cy="469334"/>
+          </a:xfrm>
+          <a:prstGeom prst="roundRect">
+            <a:avLst>
+              <a:gd name="adj" fmla="val 10466"/>
+            </a:avLst>
+          </a:prstGeom>
+          <a:solidFill>
+            <a:schemeClr val="accent3">
+              <a:lumMod val="40000"/>
+              <a:lumOff val="60000"/>
+              <a:alpha val="20000"/>
+            </a:schemeClr>
+          </a:solidFill>
+          <a:ln>
+            <a:solidFill>
+              <a:schemeClr val="accent3">
+                <a:lumMod val="75000"/>
+                <a:alpha val="8000"/>
+              </a:schemeClr>
+            </a:solidFill>
+          </a:ln>
+        </p:spPr>
+        <p:style>
+          <a:lnRef idx="1">
+            <a:schemeClr val="accent1"/>
+          </a:lnRef>
+          <a:fillRef idx="3">
+            <a:schemeClr val="accent1"/>
+          </a:fillRef>
+          <a:effectRef idx="2">
+            <a:schemeClr val="accent1"/>
+          </a:effectRef>
+          <a:fontRef idx="minor">
+            <a:schemeClr val="lt1"/>
+          </a:fontRef>
+        </p:style>
+        <p:txBody>
+          <a:bodyPr rtlCol="0" anchor="ctr"/>
+          <a:lstStyle/>
+          <a:p>
+            <a:pPr algn="ctr"/>
+            <a:endParaRPr lang="en-US"/>
+          </a:p>
+        </p:txBody>
+      </p:sp>
+      <p:cxnSp>
+        <p:nvCxnSpPr>
+          <p:cNvPr id="62" name="Straight Arrow Connector 61"/>
+          <p:cNvCxnSpPr>
+            <a:stCxn id="164" idx="3"/>
+          </p:cNvCxnSpPr>
+          <p:nvPr/>
+        </p:nvCxnSpPr>
+        <p:spPr>
+          <a:xfrm>
+            <a:off x="6512006" y="1302304"/>
+            <a:ext cx="358354" cy="0"/>
+          </a:xfrm>
+          <a:prstGeom prst="straightConnector1">
+            <a:avLst/>
+          </a:prstGeom>
+          <a:ln>
+            <a:tailEnd type="arrow"/>
+          </a:ln>
+        </p:spPr>
+        <p:style>
+          <a:lnRef idx="2">
+            <a:schemeClr val="accent1"/>
+          </a:lnRef>
+          <a:fillRef idx="0">
+            <a:schemeClr val="accent1"/>
+          </a:fillRef>
+          <a:effectRef idx="1">
+            <a:schemeClr val="accent1"/>
+          </a:effectRef>
+          <a:fontRef idx="minor">
+            <a:schemeClr val="tx1"/>
+          </a:fontRef>
+        </p:style>
+      </p:cxnSp>
+      <p:cxnSp>
+        <p:nvCxnSpPr>
+          <p:cNvPr id="171" name="Straight Arrow Connector 170"/>
+          <p:cNvCxnSpPr/>
+          <p:nvPr/>
+        </p:nvCxnSpPr>
+        <p:spPr>
+          <a:xfrm>
+            <a:off x="6529937" y="2007521"/>
+            <a:ext cx="358354" cy="0"/>
+          </a:xfrm>
+          <a:prstGeom prst="straightConnector1">
+            <a:avLst/>
+          </a:prstGeom>
+          <a:ln>
+            <a:tailEnd type="arrow"/>
+          </a:ln>
+        </p:spPr>
+        <p:style>
+          <a:lnRef idx="2">
+            <a:schemeClr val="accent1"/>
+          </a:lnRef>
+          <a:fillRef idx="0">
+            <a:schemeClr val="accent1"/>
+          </a:fillRef>
+          <a:effectRef idx="1">
+            <a:schemeClr val="accent1"/>
+          </a:effectRef>
+          <a:fontRef idx="minor">
+            <a:schemeClr val="tx1"/>
+          </a:fontRef>
+        </p:style>
+      </p:cxnSp>
+      <p:cxnSp>
+        <p:nvCxnSpPr>
+          <p:cNvPr id="172" name="Straight Arrow Connector 171"/>
+          <p:cNvCxnSpPr/>
+          <p:nvPr/>
+        </p:nvCxnSpPr>
+        <p:spPr>
+          <a:xfrm>
+            <a:off x="6529937" y="2605161"/>
+            <a:ext cx="358354" cy="0"/>
+          </a:xfrm>
+          <a:prstGeom prst="straightConnector1">
+            <a:avLst/>
+          </a:prstGeom>
+          <a:ln>
+            <a:tailEnd type="arrow"/>
+          </a:ln>
+        </p:spPr>
+        <p:style>
+          <a:lnRef idx="2">
+            <a:schemeClr val="accent1"/>
+          </a:lnRef>
+          <a:fillRef idx="0">
+            <a:schemeClr val="accent1"/>
+          </a:fillRef>
+          <a:effectRef idx="1">
+            <a:schemeClr val="accent1"/>
+          </a:effectRef>
+          <a:fontRef idx="minor">
+            <a:schemeClr val="tx1"/>
+          </a:fontRef>
+        </p:style>
+      </p:cxnSp>
+      <p:cxnSp>
+        <p:nvCxnSpPr>
+          <p:cNvPr id="174" name="Straight Arrow Connector 173"/>
+          <p:cNvCxnSpPr/>
+          <p:nvPr/>
+        </p:nvCxnSpPr>
+        <p:spPr>
+          <a:xfrm>
+            <a:off x="6547868" y="3340260"/>
+            <a:ext cx="358354" cy="0"/>
           </a:xfrm>
           <a:prstGeom prst="straightConnector1">
             <a:avLst/>

</xml_diff>

<commit_message>
With John Romein's comments incorporated. Changes in Fig. 3 block diagram. 	modified:   Figs/data_routing_transform_hierarchy.pptx 	modified:   aartfaac_sys_design_jai.tex
</commit_message>
<xml_diff>
--- a/Figs/data_routing_transform_hierarchy.pptx
+++ b/Figs/data_routing_transform_hierarchy.pptx
@@ -3102,6 +3102,61 @@
       </p:grpSpPr>
       <p:sp>
         <p:nvSpPr>
+          <p:cNvPr id="55" name="Rounded Rectangle 54"/>
+          <p:cNvSpPr/>
+          <p:nvPr/>
+        </p:nvSpPr>
+        <p:spPr>
+          <a:xfrm>
+            <a:off x="231027" y="487063"/>
+            <a:ext cx="4963163" cy="3373093"/>
+          </a:xfrm>
+          <a:prstGeom prst="roundRect">
+            <a:avLst>
+              <a:gd name="adj" fmla="val 10466"/>
+            </a:avLst>
+          </a:prstGeom>
+          <a:solidFill>
+            <a:schemeClr val="accent3">
+              <a:lumMod val="40000"/>
+              <a:lumOff val="60000"/>
+              <a:alpha val="20000"/>
+            </a:schemeClr>
+          </a:solidFill>
+          <a:ln>
+            <a:solidFill>
+              <a:schemeClr val="accent3">
+                <a:lumMod val="75000"/>
+                <a:alpha val="8000"/>
+              </a:schemeClr>
+            </a:solidFill>
+          </a:ln>
+        </p:spPr>
+        <p:style>
+          <a:lnRef idx="1">
+            <a:schemeClr val="accent1"/>
+          </a:lnRef>
+          <a:fillRef idx="3">
+            <a:schemeClr val="accent1"/>
+          </a:fillRef>
+          <a:effectRef idx="2">
+            <a:schemeClr val="accent1"/>
+          </a:effectRef>
+          <a:fontRef idx="minor">
+            <a:schemeClr val="lt1"/>
+          </a:fontRef>
+        </p:style>
+        <p:txBody>
+          <a:bodyPr rtlCol="0" anchor="ctr"/>
+          <a:lstStyle/>
+          <a:p>
+            <a:pPr algn="ctr"/>
+            <a:endParaRPr lang="en-US"/>
+          </a:p>
+        </p:txBody>
+      </p:sp>
+      <p:sp>
+        <p:nvSpPr>
           <p:cNvPr id="194" name="Rectangle 193"/>
           <p:cNvSpPr/>
           <p:nvPr/>
@@ -3140,10 +3195,6 @@
           <a:lstStyle/>
           <a:p>
             <a:pPr algn="ctr"/>
-            <a:r>
-              <a:rPr lang="en-US" dirty="0" smtClean="0"/>
-              <a:t>Corr1</a:t>
-            </a:r>
             <a:endParaRPr lang="en-US" dirty="0"/>
           </a:p>
         </p:txBody>
@@ -3183,10 +3234,18 @@
           <a:p>
             <a:pPr algn="ctr"/>
             <a:r>
-              <a:rPr lang="en-US" sz="1400" dirty="0" smtClean="0"/>
+              <a:rPr lang="en-US" sz="1400" dirty="0" smtClean="0">
+                <a:solidFill>
+                  <a:srgbClr val="595959"/>
+                </a:solidFill>
+              </a:rPr>
               <a:t>NUMA 0 memory</a:t>
             </a:r>
-            <a:endParaRPr lang="en-US" sz="1400" dirty="0"/>
+            <a:endParaRPr lang="en-US" sz="1400" dirty="0">
+              <a:solidFill>
+                <a:srgbClr val="595959"/>
+              </a:solidFill>
+            </a:endParaRPr>
           </a:p>
         </p:txBody>
       </p:sp>
@@ -3269,7 +3328,23 @@
               </a:r>
               <a:r>
                 <a:rPr lang="en-US" dirty="0" smtClean="0"/>
-                <a:t>,sb[0-35],t</a:t>
+                <a:t>,sb[0</a:t>
+              </a:r>
+              <a:r>
+                <a:rPr lang="en-US" dirty="0" smtClean="0"/>
+                <a:t>-</a:t>
+              </a:r>
+              <a:r>
+                <a:rPr lang="en-US" dirty="0" smtClean="0"/>
+                <a:t>71</a:t>
+              </a:r>
+              <a:r>
+                <a:rPr lang="en-US" dirty="0" smtClean="0"/>
+                <a:t>]</a:t>
+              </a:r>
+              <a:r>
+                <a:rPr lang="en-US" dirty="0" smtClean="0"/>
+                <a:t>,t</a:t>
               </a:r>
               <a:endParaRPr lang="en-US" dirty="0"/>
             </a:p>
@@ -3311,10 +3386,24 @@
           <a:p>
             <a:pPr algn="ctr"/>
             <a:r>
-              <a:rPr lang="en-US" dirty="0" smtClean="0"/>
+              <a:rPr lang="en-US" dirty="0" smtClean="0">
+                <a:solidFill>
+                  <a:schemeClr val="tx1">
+                    <a:lumMod val="65000"/>
+                    <a:lumOff val="35000"/>
+                  </a:schemeClr>
+                </a:solidFill>
+              </a:rPr>
               <a:t>RSP0</a:t>
             </a:r>
-            <a:endParaRPr lang="en-US" dirty="0"/>
+            <a:endParaRPr lang="en-US" dirty="0">
+              <a:solidFill>
+                <a:schemeClr val="tx1">
+                  <a:lumMod val="65000"/>
+                  <a:lumOff val="35000"/>
+                </a:schemeClr>
+              </a:solidFill>
+            </a:endParaRPr>
           </a:p>
         </p:txBody>
       </p:sp>
@@ -3397,7 +3486,23 @@
               </a:r>
               <a:r>
                 <a:rPr lang="en-US" dirty="0" smtClean="0"/>
-                <a:t>,sb[0-35],t</a:t>
+                <a:t>,sb[0</a:t>
+              </a:r>
+              <a:r>
+                <a:rPr lang="en-US" dirty="0" smtClean="0"/>
+                <a:t>-</a:t>
+              </a:r>
+              <a:r>
+                <a:rPr lang="en-US" dirty="0" smtClean="0"/>
+                <a:t>71</a:t>
+              </a:r>
+              <a:r>
+                <a:rPr lang="en-US" dirty="0" smtClean="0"/>
+                <a:t>]</a:t>
+              </a:r>
+              <a:r>
+                <a:rPr lang="en-US" dirty="0" smtClean="0"/>
+                <a:t>,t</a:t>
               </a:r>
               <a:endParaRPr lang="en-US" dirty="0"/>
             </a:p>
@@ -3439,10 +3544,18 @@
           <a:p>
             <a:pPr algn="ctr"/>
             <a:r>
-              <a:rPr lang="en-US" dirty="0" smtClean="0"/>
+              <a:rPr lang="en-US" dirty="0" smtClean="0">
+                <a:solidFill>
+                  <a:srgbClr val="595959"/>
+                </a:solidFill>
+              </a:rPr>
               <a:t>1</a:t>
             </a:r>
-            <a:endParaRPr lang="en-US" dirty="0"/>
+            <a:endParaRPr lang="en-US" dirty="0">
+              <a:solidFill>
+                <a:srgbClr val="595959"/>
+              </a:solidFill>
+            </a:endParaRPr>
           </a:p>
         </p:txBody>
       </p:sp>
@@ -3481,7 +3594,11 @@
           <a:p>
             <a:pPr algn="ctr"/>
             <a:r>
-              <a:rPr lang="en-US" dirty="0"/>
+              <a:rPr lang="en-US" dirty="0">
+                <a:solidFill>
+                  <a:srgbClr val="595959"/>
+                </a:solidFill>
+              </a:rPr>
               <a:t>2</a:t>
             </a:r>
           </a:p>
@@ -3522,7 +3639,11 @@
           <a:p>
             <a:pPr algn="ctr"/>
             <a:r>
-              <a:rPr lang="en-US" dirty="0"/>
+              <a:rPr lang="en-US" dirty="0">
+                <a:solidFill>
+                  <a:srgbClr val="595959"/>
+                </a:solidFill>
+              </a:rPr>
               <a:t>3</a:t>
             </a:r>
           </a:p>
@@ -3543,7 +3664,7 @@
             <a:avLst/>
           </a:prstGeom>
           <a:solidFill>
-            <a:schemeClr val="accent6"/>
+            <a:srgbClr val="F0CF43"/>
           </a:solidFill>
         </p:spPr>
         <p:style>
@@ -3566,18 +3687,46 @@
           <a:p>
             <a:pPr algn="ctr"/>
             <a:r>
-              <a:rPr lang="en-US" dirty="0" smtClean="0"/>
+              <a:rPr lang="en-US" dirty="0" smtClean="0">
+                <a:solidFill>
+                  <a:schemeClr val="tx1">
+                    <a:lumMod val="65000"/>
+                    <a:lumOff val="35000"/>
+                  </a:schemeClr>
+                </a:solidFill>
+              </a:rPr>
               <a:t>UR</a:t>
             </a:r>
             <a:r>
-              <a:rPr lang="en-US" dirty="0"/>
+              <a:rPr lang="en-US" dirty="0">
+                <a:solidFill>
+                  <a:schemeClr val="tx1">
+                    <a:lumMod val="65000"/>
+                    <a:lumOff val="35000"/>
+                  </a:schemeClr>
+                </a:solidFill>
+              </a:rPr>
               <a:t>I</a:t>
             </a:r>
             <a:r>
-              <a:rPr lang="en-US" dirty="0" smtClean="0"/>
+              <a:rPr lang="en-US" dirty="0" smtClean="0">
+                <a:solidFill>
+                  <a:schemeClr val="tx1">
+                    <a:lumMod val="65000"/>
+                    <a:lumOff val="35000"/>
+                  </a:schemeClr>
+                </a:solidFill>
+              </a:rPr>
               <a:t>0</a:t>
             </a:r>
-            <a:endParaRPr lang="en-US" dirty="0"/>
+            <a:endParaRPr lang="en-US" dirty="0">
+              <a:solidFill>
+                <a:schemeClr val="tx1">
+                  <a:lumMod val="65000"/>
+                  <a:lumOff val="35000"/>
+                </a:schemeClr>
+              </a:solidFill>
+            </a:endParaRPr>
           </a:p>
         </p:txBody>
       </p:sp>
@@ -3744,7 +3893,23 @@
               </a:r>
               <a:r>
                 <a:rPr lang="en-US" dirty="0" smtClean="0"/>
-                <a:t>,sb[0-35],t</a:t>
+                <a:t>,sb[0</a:t>
+              </a:r>
+              <a:r>
+                <a:rPr lang="en-US" dirty="0" smtClean="0"/>
+                <a:t>-</a:t>
+              </a:r>
+              <a:r>
+                <a:rPr lang="en-US" dirty="0" smtClean="0"/>
+                <a:t>71</a:t>
+              </a:r>
+              <a:r>
+                <a:rPr lang="en-US" dirty="0" smtClean="0"/>
+                <a:t>]</a:t>
+              </a:r>
+              <a:r>
+                <a:rPr lang="en-US" dirty="0" smtClean="0"/>
+                <a:t>,t</a:t>
               </a:r>
               <a:endParaRPr lang="en-US" dirty="0"/>
             </a:p>
@@ -3900,7 +4065,7 @@
             <a:avLst/>
           </a:prstGeom>
           <a:solidFill>
-            <a:schemeClr val="accent6"/>
+            <a:srgbClr val="F0CF43"/>
           </a:solidFill>
         </p:spPr>
         <p:style>
@@ -3923,10 +4088,18 @@
           <a:p>
             <a:pPr algn="ctr"/>
             <a:r>
-              <a:rPr lang="en-US" dirty="0" smtClean="0"/>
+              <a:rPr lang="en-US" dirty="0" smtClean="0">
+                <a:solidFill>
+                  <a:srgbClr val="595959"/>
+                </a:solidFill>
+              </a:rPr>
               <a:t>1</a:t>
             </a:r>
-            <a:endParaRPr lang="en-US" dirty="0"/>
+            <a:endParaRPr lang="en-US" dirty="0">
+              <a:solidFill>
+                <a:srgbClr val="595959"/>
+              </a:solidFill>
+            </a:endParaRPr>
           </a:p>
         </p:txBody>
       </p:sp>
@@ -3945,7 +4118,7 @@
             <a:avLst/>
           </a:prstGeom>
           <a:solidFill>
-            <a:schemeClr val="accent6"/>
+            <a:srgbClr val="F0CF43"/>
           </a:solidFill>
         </p:spPr>
         <p:style>
@@ -3968,10 +4141,18 @@
           <a:p>
             <a:pPr algn="ctr"/>
             <a:r>
-              <a:rPr lang="en-US" dirty="0" err="1" smtClean="0"/>
+              <a:rPr lang="en-US" dirty="0" err="1" smtClean="0">
+                <a:solidFill>
+                  <a:srgbClr val="595959"/>
+                </a:solidFill>
+              </a:rPr>
               <a:t>UNIBoARD</a:t>
             </a:r>
-            <a:endParaRPr lang="en-US" dirty="0"/>
+            <a:endParaRPr lang="en-US" dirty="0">
+              <a:solidFill>
+                <a:srgbClr val="595959"/>
+              </a:solidFill>
+            </a:endParaRPr>
           </a:p>
         </p:txBody>
       </p:sp>
@@ -4031,7 +4212,7 @@
           <p:spPr>
             <a:xfrm>
               <a:off x="330563" y="487063"/>
-              <a:ext cx="1723549" cy="369332"/>
+              <a:ext cx="1838965" cy="369332"/>
             </a:xfrm>
             <a:prstGeom prst="rect">
               <a:avLst/>
@@ -4066,7 +4247,23 @@
                     <a:schemeClr val="accent6"/>
                   </a:solidFill>
                 </a:rPr>
-                <a:t>0-31],sb[0-8],t</a:t>
+                <a:t>0-31],sb[0</a:t>
+              </a:r>
+              <a:r>
+                <a:rPr lang="en-US" dirty="0" smtClean="0">
+                  <a:solidFill>
+                    <a:schemeClr val="accent6"/>
+                  </a:solidFill>
+                </a:rPr>
+                <a:t>-17]</a:t>
+              </a:r>
+              <a:r>
+                <a:rPr lang="en-US" dirty="0" smtClean="0">
+                  <a:solidFill>
+                    <a:schemeClr val="accent6"/>
+                  </a:solidFill>
+                </a:rPr>
+                <a:t>,t</a:t>
               </a:r>
               <a:endParaRPr lang="en-US" dirty="0">
                 <a:solidFill>
@@ -4086,9 +4283,9 @@
         <p:grpSpPr>
           <a:xfrm>
             <a:off x="2862307" y="1000603"/>
-            <a:ext cx="1851789" cy="369332"/>
+            <a:ext cx="1954381" cy="369332"/>
             <a:chOff x="330563" y="487063"/>
-            <a:chExt cx="1851789" cy="369332"/>
+            <a:chExt cx="1954381" cy="369332"/>
           </a:xfrm>
         </p:grpSpPr>
         <p:cxnSp>
@@ -4133,7 +4330,7 @@
           <p:spPr>
             <a:xfrm>
               <a:off x="330563" y="487063"/>
-              <a:ext cx="1838965" cy="369332"/>
+              <a:ext cx="1954381" cy="369332"/>
             </a:xfrm>
             <a:prstGeom prst="rect">
               <a:avLst/>
@@ -4164,7 +4361,11 @@
               </a:r>
               <a:r>
                 <a:rPr lang="en-US" dirty="0" smtClean="0"/>
-                <a:t>[9-17],t</a:t>
+                <a:t>[18-35]</a:t>
+              </a:r>
+              <a:r>
+                <a:rPr lang="en-US" dirty="0" smtClean="0"/>
+                <a:t>,t</a:t>
               </a:r>
               <a:endParaRPr lang="en-US" dirty="0"/>
             </a:p>
@@ -4258,7 +4459,19 @@
               </a:r>
               <a:r>
                 <a:rPr lang="en-US" dirty="0" smtClean="0"/>
-                <a:t>[18-26],t</a:t>
+                <a:t>[</a:t>
+              </a:r>
+              <a:r>
+                <a:rPr lang="en-US" dirty="0" smtClean="0"/>
+                <a:t>36</a:t>
+              </a:r>
+              <a:r>
+                <a:rPr lang="en-US" dirty="0" smtClean="0"/>
+                <a:t>-53]</a:t>
+              </a:r>
+              <a:r>
+                <a:rPr lang="en-US" dirty="0" smtClean="0"/>
+                <a:t>,t</a:t>
               </a:r>
               <a:endParaRPr lang="en-US" dirty="0"/>
             </a:p>
@@ -4352,7 +4565,19 @@
               </a:r>
               <a:r>
                 <a:rPr lang="en-US" dirty="0" smtClean="0"/>
-                <a:t>[27-35],t</a:t>
+                <a:t>[</a:t>
+              </a:r>
+              <a:r>
+                <a:rPr lang="en-US" dirty="0" smtClean="0"/>
+                <a:t>54</a:t>
+              </a:r>
+              <a:r>
+                <a:rPr lang="en-US" dirty="0" smtClean="0"/>
+                <a:t>-71]</a:t>
+              </a:r>
+              <a:r>
+                <a:rPr lang="en-US" dirty="0" smtClean="0"/>
+                <a:t>,t</a:t>
               </a:r>
               <a:endParaRPr lang="en-US" dirty="0"/>
             </a:p>
@@ -4368,9 +4593,9 @@
         <p:grpSpPr>
           <a:xfrm>
             <a:off x="2871341" y="2488263"/>
-            <a:ext cx="1855971" cy="369332"/>
+            <a:ext cx="1954381" cy="369332"/>
             <a:chOff x="330563" y="487063"/>
-            <a:chExt cx="1855971" cy="369332"/>
+            <a:chExt cx="1954381" cy="369332"/>
           </a:xfrm>
         </p:grpSpPr>
         <p:cxnSp>
@@ -4415,7 +4640,7 @@
           <p:spPr>
             <a:xfrm>
               <a:off x="330563" y="487063"/>
-              <a:ext cx="1838965" cy="369332"/>
+              <a:ext cx="1954381" cy="369332"/>
             </a:xfrm>
             <a:prstGeom prst="rect">
               <a:avLst/>
@@ -4466,7 +4691,23 @@
                     <a:srgbClr val="F79646"/>
                   </a:solidFill>
                 </a:rPr>
-                <a:t>[0-8],t</a:t>
+                <a:t>[0</a:t>
+              </a:r>
+              <a:r>
+                <a:rPr lang="en-US" dirty="0" smtClean="0">
+                  <a:solidFill>
+                    <a:srgbClr val="F79646"/>
+                  </a:solidFill>
+                </a:rPr>
+                <a:t>-17]</a:t>
+              </a:r>
+              <a:r>
+                <a:rPr lang="en-US" dirty="0" smtClean="0">
+                  <a:solidFill>
+                    <a:srgbClr val="F79646"/>
+                  </a:solidFill>
+                </a:rPr>
+                <a:t>,t</a:t>
               </a:r>
               <a:endParaRPr lang="en-US" dirty="0">
                 <a:solidFill>
@@ -4486,9 +4727,9 @@
         <p:grpSpPr>
           <a:xfrm>
             <a:off x="2867159" y="3075538"/>
-            <a:ext cx="1855971" cy="369332"/>
+            <a:ext cx="1954381" cy="369332"/>
             <a:chOff x="330563" y="487063"/>
-            <a:chExt cx="1855971" cy="369332"/>
+            <a:chExt cx="1954381" cy="369332"/>
           </a:xfrm>
         </p:grpSpPr>
         <p:cxnSp>
@@ -4533,7 +4774,7 @@
           <p:spPr>
             <a:xfrm>
               <a:off x="330563" y="487063"/>
-              <a:ext cx="1838965" cy="369332"/>
+              <a:ext cx="1954381" cy="369332"/>
             </a:xfrm>
             <a:prstGeom prst="rect">
               <a:avLst/>
@@ -4584,7 +4825,23 @@
                     <a:srgbClr val="F79646"/>
                   </a:solidFill>
                 </a:rPr>
-                <a:t>[0-8],t</a:t>
+                <a:t>[0</a:t>
+              </a:r>
+              <a:r>
+                <a:rPr lang="en-US" dirty="0" smtClean="0">
+                  <a:solidFill>
+                    <a:srgbClr val="F79646"/>
+                  </a:solidFill>
+                </a:rPr>
+                <a:t>-17]</a:t>
+              </a:r>
+              <a:r>
+                <a:rPr lang="en-US" dirty="0" smtClean="0">
+                  <a:solidFill>
+                    <a:srgbClr val="F79646"/>
+                  </a:solidFill>
+                </a:rPr>
+                <a:t>,t</a:t>
               </a:r>
               <a:endParaRPr lang="en-US" dirty="0">
                 <a:solidFill>
@@ -4709,7 +4966,7 @@
             <a:avLst/>
           </a:prstGeom>
           <a:solidFill>
-            <a:schemeClr val="accent6"/>
+            <a:srgbClr val="F0CF43"/>
           </a:solidFill>
         </p:spPr>
         <p:style>
@@ -4732,7 +4989,11 @@
           <a:p>
             <a:pPr algn="ctr"/>
             <a:r>
-              <a:rPr lang="en-US" dirty="0"/>
+              <a:rPr lang="en-US" dirty="0">
+                <a:solidFill>
+                  <a:srgbClr val="595959"/>
+                </a:solidFill>
+              </a:rPr>
               <a:t>2</a:t>
             </a:r>
           </a:p>
@@ -4773,10 +5034,18 @@
           <a:p>
             <a:pPr algn="ctr"/>
             <a:r>
-              <a:rPr lang="en-US" sz="1200" dirty="0" smtClean="0"/>
+              <a:rPr lang="en-US" sz="1200" dirty="0" smtClean="0">
+                <a:solidFill>
+                  <a:srgbClr val="595959"/>
+                </a:solidFill>
+              </a:rPr>
               <a:t>11</a:t>
             </a:r>
-            <a:endParaRPr lang="en-US" sz="1200" dirty="0"/>
+            <a:endParaRPr lang="en-US" sz="1200" dirty="0">
+              <a:solidFill>
+                <a:srgbClr val="595959"/>
+              </a:solidFill>
+            </a:endParaRPr>
           </a:p>
         </p:txBody>
       </p:sp>
@@ -4859,7 +5128,23 @@
               </a:r>
               <a:r>
                 <a:rPr lang="en-US" dirty="0" smtClean="0"/>
-                <a:t>,sb[0-35],t</a:t>
+                <a:t>,sb[0</a:t>
+              </a:r>
+              <a:r>
+                <a:rPr lang="en-US" dirty="0" smtClean="0"/>
+                <a:t>-</a:t>
+              </a:r>
+              <a:r>
+                <a:rPr lang="en-US" dirty="0" smtClean="0"/>
+                <a:t>71</a:t>
+              </a:r>
+              <a:r>
+                <a:rPr lang="en-US" dirty="0" smtClean="0"/>
+                <a:t>]</a:t>
+              </a:r>
+              <a:r>
+                <a:rPr lang="en-US" dirty="0" smtClean="0"/>
+                <a:t>,t</a:t>
               </a:r>
               <a:endParaRPr lang="en-US" dirty="0"/>
             </a:p>
@@ -5180,7 +5465,7 @@
         </p:nvSpPr>
         <p:spPr>
           <a:xfrm>
-            <a:off x="4587872" y="3490823"/>
+            <a:off x="3736235" y="3580469"/>
             <a:ext cx="606318" cy="369332"/>
           </a:xfrm>
           <a:prstGeom prst="rect">
@@ -5217,7 +5502,7 @@
             <a:avLst/>
           </a:prstGeom>
           <a:solidFill>
-            <a:schemeClr val="accent6"/>
+            <a:srgbClr val="F0CF43"/>
           </a:solidFill>
         </p:spPr>
         <p:style>
@@ -5240,10 +5525,18 @@
           <a:p>
             <a:pPr algn="ctr"/>
             <a:r>
-              <a:rPr lang="en-US" dirty="0" smtClean="0"/>
+              <a:rPr lang="en-US" dirty="0" smtClean="0">
+                <a:solidFill>
+                  <a:srgbClr val="595959"/>
+                </a:solidFill>
+              </a:rPr>
               <a:t>ETH.SWITCH</a:t>
             </a:r>
-            <a:endParaRPr lang="en-US" dirty="0"/>
+            <a:endParaRPr lang="en-US" dirty="0">
+              <a:solidFill>
+                <a:srgbClr val="595959"/>
+              </a:solidFill>
+            </a:endParaRPr>
           </a:p>
         </p:txBody>
       </p:sp>
@@ -5303,7 +5596,7 @@
           <p:spPr>
             <a:xfrm>
               <a:off x="330563" y="487063"/>
-              <a:ext cx="1723549" cy="369332"/>
+              <a:ext cx="1838965" cy="369332"/>
             </a:xfrm>
             <a:prstGeom prst="rect">
               <a:avLst/>
@@ -5338,7 +5631,23 @@
                     <a:schemeClr val="accent6"/>
                   </a:solidFill>
                 </a:rPr>
-                <a:t>0-95],sb[0-7],t</a:t>
+                <a:t>0-95],sb[0</a:t>
+              </a:r>
+              <a:r>
+                <a:rPr lang="en-US" dirty="0" smtClean="0">
+                  <a:solidFill>
+                    <a:schemeClr val="accent6"/>
+                  </a:solidFill>
+                </a:rPr>
+                <a:t>-31]</a:t>
+              </a:r>
+              <a:r>
+                <a:rPr lang="en-US" dirty="0" smtClean="0">
+                  <a:solidFill>
+                    <a:schemeClr val="accent6"/>
+                  </a:solidFill>
+                </a:rPr>
+                <a:t>,t</a:t>
               </a:r>
               <a:endParaRPr lang="en-US" dirty="0">
                 <a:solidFill>
@@ -5562,9 +5871,9 @@
         <p:grpSpPr>
           <a:xfrm>
             <a:off x="7157717" y="575278"/>
-            <a:ext cx="1865005" cy="369332"/>
+            <a:ext cx="2193377" cy="365295"/>
             <a:chOff x="330563" y="487063"/>
-            <a:chExt cx="1865005" cy="369332"/>
+            <a:chExt cx="2193377" cy="365295"/>
           </a:xfrm>
         </p:grpSpPr>
         <p:cxnSp>
@@ -5574,9 +5883,9 @@
             <p:nvPr/>
           </p:nvCxnSpPr>
           <p:spPr>
-            <a:xfrm>
-              <a:off x="400155" y="852358"/>
-              <a:ext cx="1795413" cy="4037"/>
+            <a:xfrm flipV="1">
+              <a:off x="400155" y="841086"/>
+              <a:ext cx="2123785" cy="11272"/>
             </a:xfrm>
             <a:prstGeom prst="straightConnector1">
               <a:avLst/>
@@ -5609,7 +5918,7 @@
           <p:spPr>
             <a:xfrm>
               <a:off x="330563" y="487063"/>
-              <a:ext cx="1652916" cy="338554"/>
+              <a:ext cx="1756911" cy="338554"/>
             </a:xfrm>
             <a:prstGeom prst="rect">
               <a:avLst/>
@@ -5636,7 +5945,23 @@
                     <a:schemeClr val="accent6"/>
                   </a:solidFill>
                 </a:rPr>
-                <a:t>0-575],sb[0-7],t</a:t>
+                <a:t>0-575],sb[0</a:t>
+              </a:r>
+              <a:r>
+                <a:rPr lang="en-US" sz="1600" dirty="0" smtClean="0">
+                  <a:solidFill>
+                    <a:schemeClr val="accent6"/>
+                  </a:solidFill>
+                </a:rPr>
+                <a:t>-15]</a:t>
+              </a:r>
+              <a:r>
+                <a:rPr lang="en-US" sz="1600" dirty="0" smtClean="0">
+                  <a:solidFill>
+                    <a:schemeClr val="accent6"/>
+                  </a:solidFill>
+                </a:rPr>
+                <a:t>,t</a:t>
               </a:r>
               <a:endParaRPr lang="en-US" sz="1600" dirty="0">
                 <a:solidFill>
@@ -5656,9 +5981,9 @@
         <p:grpSpPr>
           <a:xfrm>
             <a:off x="7151375" y="1256908"/>
-            <a:ext cx="1964901" cy="369332"/>
+            <a:ext cx="2199719" cy="369332"/>
             <a:chOff x="330563" y="487063"/>
-            <a:chExt cx="1964901" cy="369332"/>
+            <a:chExt cx="2199719" cy="369332"/>
           </a:xfrm>
         </p:grpSpPr>
         <p:cxnSp>
@@ -5670,7 +5995,7 @@
           <p:spPr>
             <a:xfrm>
               <a:off x="400155" y="852358"/>
-              <a:ext cx="1795413" cy="4037"/>
+              <a:ext cx="2130127" cy="4037"/>
             </a:xfrm>
             <a:prstGeom prst="straightConnector1">
               <a:avLst/>
@@ -5703,7 +6028,7 @@
           <p:spPr>
             <a:xfrm>
               <a:off x="330563" y="487063"/>
-              <a:ext cx="1964901" cy="338554"/>
+              <a:ext cx="2069797" cy="338554"/>
             </a:xfrm>
             <a:prstGeom prst="rect">
               <a:avLst/>
@@ -5738,7 +6063,23 @@
                     <a:schemeClr val="accent6"/>
                   </a:solidFill>
                 </a:rPr>
-                <a:t>576-1151],sb[0-7],t</a:t>
+                <a:t>576-1151],sb[0</a:t>
+              </a:r>
+              <a:r>
+                <a:rPr lang="en-US" sz="1600" dirty="0" smtClean="0">
+                  <a:solidFill>
+                    <a:schemeClr val="accent6"/>
+                  </a:solidFill>
+                </a:rPr>
+                <a:t>-15]</a:t>
+              </a:r>
+              <a:r>
+                <a:rPr lang="en-US" sz="1600" dirty="0" smtClean="0">
+                  <a:solidFill>
+                    <a:schemeClr val="accent6"/>
+                  </a:solidFill>
+                </a:rPr>
+                <a:t>,t</a:t>
               </a:r>
               <a:endParaRPr lang="en-US" sz="1600" dirty="0">
                 <a:solidFill>
@@ -5758,9 +6099,9 @@
         <p:grpSpPr>
           <a:xfrm>
             <a:off x="7151375" y="2315368"/>
-            <a:ext cx="1954381" cy="369332"/>
+            <a:ext cx="2070436" cy="369332"/>
             <a:chOff x="330563" y="487063"/>
-            <a:chExt cx="1954381" cy="369332"/>
+            <a:chExt cx="2070436" cy="369332"/>
           </a:xfrm>
         </p:grpSpPr>
         <p:cxnSp>
@@ -5805,7 +6146,7 @@
           <p:spPr>
             <a:xfrm>
               <a:off x="330563" y="487063"/>
-              <a:ext cx="1954381" cy="369332"/>
+              <a:ext cx="2070436" cy="369332"/>
             </a:xfrm>
             <a:prstGeom prst="rect">
               <a:avLst/>
@@ -5856,7 +6197,15 @@
                     <a:schemeClr val="accent6"/>
                   </a:solidFill>
                 </a:rPr>
-                <a:t>[8-15],t</a:t>
+                <a:t>[16-31]</a:t>
+              </a:r>
+              <a:r>
+                <a:rPr lang="en-US" dirty="0" smtClean="0">
+                  <a:solidFill>
+                    <a:schemeClr val="accent6"/>
+                  </a:solidFill>
+                </a:rPr>
+                <a:t>,t</a:t>
               </a:r>
               <a:endParaRPr lang="en-US" dirty="0">
                 <a:solidFill>
@@ -5876,9 +6225,9 @@
         <p:grpSpPr>
           <a:xfrm>
             <a:off x="7145033" y="2996998"/>
-            <a:ext cx="2304425" cy="369332"/>
+            <a:ext cx="2421418" cy="369332"/>
             <a:chOff x="330563" y="487063"/>
-            <a:chExt cx="2304425" cy="369332"/>
+            <a:chExt cx="2421418" cy="369332"/>
           </a:xfrm>
         </p:grpSpPr>
         <p:cxnSp>
@@ -5923,7 +6272,7 @@
           <p:spPr>
             <a:xfrm>
               <a:off x="330563" y="487063"/>
-              <a:ext cx="2304425" cy="369332"/>
+              <a:ext cx="2421418" cy="369332"/>
             </a:xfrm>
             <a:prstGeom prst="rect">
               <a:avLst/>
@@ -5974,7 +6323,15 @@
                     <a:schemeClr val="accent6"/>
                   </a:solidFill>
                 </a:rPr>
-                <a:t>[8-15],t</a:t>
+                <a:t>[16-31]</a:t>
+              </a:r>
+              <a:r>
+                <a:rPr lang="en-US" dirty="0" smtClean="0">
+                  <a:solidFill>
+                    <a:schemeClr val="accent6"/>
+                  </a:solidFill>
+                </a:rPr>
+                <a:t>,t</a:t>
               </a:r>
               <a:endParaRPr lang="en-US" dirty="0">
                 <a:solidFill>
@@ -6020,10 +6377,18 @@
           <a:p>
             <a:pPr algn="ctr"/>
             <a:r>
-              <a:rPr lang="en-US" sz="1400" dirty="0" smtClean="0"/>
+              <a:rPr lang="en-US" sz="1400" dirty="0" smtClean="0">
+                <a:solidFill>
+                  <a:srgbClr val="595959"/>
+                </a:solidFill>
+              </a:rPr>
               <a:t>NUMA 1 memory</a:t>
             </a:r>
-            <a:endParaRPr lang="en-US" sz="1400" dirty="0"/>
+            <a:endParaRPr lang="en-US" sz="1400" dirty="0">
+              <a:solidFill>
+                <a:srgbClr val="595959"/>
+              </a:solidFill>
+            </a:endParaRPr>
           </a:p>
         </p:txBody>
       </p:sp>
@@ -7140,13 +7505,13 @@
           <p:nvPr/>
         </p:nvCxnSpPr>
         <p:spPr>
-          <a:xfrm rot="5400000">
-            <a:off x="7634820" y="3520555"/>
-            <a:ext cx="1533076" cy="1216301"/>
+          <a:xfrm rot="10800000" flipV="1">
+            <a:off x="7793209" y="3367546"/>
+            <a:ext cx="1664557" cy="1527698"/>
           </a:xfrm>
           <a:prstGeom prst="bentConnector3">
             <a:avLst>
-              <a:gd name="adj1" fmla="val 99704"/>
+              <a:gd name="adj1" fmla="val -2061"/>
             </a:avLst>
           </a:prstGeom>
           <a:ln>
@@ -7178,8 +7543,8 @@
         </p:nvCxnSpPr>
         <p:spPr>
           <a:xfrm rot="5400000">
-            <a:off x="7045104" y="3373759"/>
-            <a:ext cx="2987538" cy="1624441"/>
+            <a:off x="7210499" y="3208364"/>
+            <a:ext cx="2987537" cy="1955230"/>
           </a:xfrm>
           <a:prstGeom prst="bentConnector2">
             <a:avLst/>
@@ -7212,7 +7577,7 @@
         <p:spPr>
           <a:xfrm flipV="1">
             <a:off x="9009506" y="2680663"/>
-            <a:ext cx="341587" cy="11546"/>
+            <a:ext cx="672377" cy="11546"/>
           </a:xfrm>
           <a:prstGeom prst="line">
             <a:avLst/>
@@ -7241,8 +7606,8 @@
         </p:nvSpPr>
         <p:spPr>
           <a:xfrm rot="16200000">
-            <a:off x="665091" y="5300005"/>
-            <a:ext cx="2070436" cy="369332"/>
+            <a:off x="606594" y="5300005"/>
+            <a:ext cx="2187430" cy="369332"/>
           </a:xfrm>
           <a:prstGeom prst="rect">
             <a:avLst/>
@@ -7269,7 +7634,7 @@
                   <a:srgbClr val="0000FF"/>
                 </a:solidFill>
               </a:rPr>
-              <a:t>[8-15</a:t>
+              <a:t>[</a:t>
             </a:r>
             <a:r>
               <a:rPr lang="en-US" dirty="0" smtClean="0">
@@ -7277,7 +7642,15 @@
                   <a:srgbClr val="0000FF"/>
                 </a:solidFill>
               </a:rPr>
-              <a:t>],d[</a:t>
+              <a:t>16</a:t>
+            </a:r>
+            <a:r>
+              <a:rPr lang="en-US" dirty="0" smtClean="0">
+                <a:solidFill>
+                  <a:srgbClr val="0000FF"/>
+                </a:solidFill>
+              </a:rPr>
+              <a:t>-31],d[</a:t>
             </a:r>
             <a:r>
               <a:rPr lang="en-US" dirty="0" smtClean="0">
@@ -7380,9 +7753,9 @@
           <p:nvPr/>
         </p:nvSpPr>
         <p:spPr>
-          <a:xfrm>
-            <a:off x="9009506" y="774469"/>
-            <a:ext cx="791906" cy="1010080"/>
+          <a:xfrm rot="16200000">
+            <a:off x="9012112" y="1028175"/>
+            <a:ext cx="1117437" cy="439473"/>
           </a:xfrm>
           <a:prstGeom prst="rect">
             <a:avLst/>
@@ -7414,10 +7787,18 @@
           <a:p>
             <a:pPr algn="ctr"/>
             <a:r>
-              <a:rPr lang="en-US" dirty="0" smtClean="0"/>
+              <a:rPr lang="en-US" dirty="0" smtClean="0">
+                <a:solidFill>
+                  <a:srgbClr val="595959"/>
+                </a:solidFill>
+              </a:rPr>
               <a:t>Corr0</a:t>
             </a:r>
-            <a:endParaRPr lang="en-US" dirty="0"/>
+            <a:endParaRPr lang="en-US" dirty="0">
+              <a:solidFill>
+                <a:srgbClr val="595959"/>
+              </a:solidFill>
+            </a:endParaRPr>
           </a:p>
         </p:txBody>
       </p:sp>
@@ -7534,7 +7915,7 @@
             <a:avLst/>
           </a:prstGeom>
           <a:solidFill>
-            <a:schemeClr val="accent6"/>
+            <a:srgbClr val="F0CF43"/>
           </a:solidFill>
         </p:spPr>
         <p:style>
@@ -7557,21 +7938,37 @@
           <a:p>
             <a:pPr algn="ctr"/>
             <a:r>
-              <a:rPr lang="en-US" sz="1400" dirty="0" smtClean="0"/>
+              <a:rPr lang="en-US" sz="1400" dirty="0" smtClean="0">
+                <a:solidFill>
+                  <a:srgbClr val="595959"/>
+                </a:solidFill>
+              </a:rPr>
               <a:t>AL</a:t>
             </a:r>
           </a:p>
           <a:p>
             <a:pPr algn="ctr"/>
             <a:r>
-              <a:rPr lang="en-US" sz="1400" dirty="0" smtClean="0"/>
+              <a:rPr lang="en-US" sz="1400" dirty="0" smtClean="0">
+                <a:solidFill>
+                  <a:srgbClr val="595959"/>
+                </a:solidFill>
+              </a:rPr>
               <a:t>IGN</a:t>
             </a:r>
             <a:r>
-              <a:rPr lang="en-US" sz="1400" dirty="0" smtClean="0"/>
+              <a:rPr lang="en-US" sz="1400" dirty="0" smtClean="0">
+                <a:solidFill>
+                  <a:srgbClr val="595959"/>
+                </a:solidFill>
+              </a:rPr>
               <a:t>+COLLATE</a:t>
             </a:r>
-            <a:endParaRPr lang="en-US" sz="1400" dirty="0"/>
+            <a:endParaRPr lang="en-US" sz="1400" dirty="0">
+              <a:solidFill>
+                <a:srgbClr val="595959"/>
+              </a:solidFill>
+            </a:endParaRPr>
           </a:p>
         </p:txBody>
       </p:sp>
@@ -7624,18 +8021,34 @@
             <a:p>
               <a:pPr algn="ctr"/>
               <a:r>
-                <a:rPr lang="en-US" dirty="0" smtClean="0"/>
+                <a:rPr lang="en-US" dirty="0" smtClean="0">
+                  <a:solidFill>
+                    <a:srgbClr val="595959"/>
+                  </a:solidFill>
+                </a:rPr>
                 <a:t>2</a:t>
               </a:r>
               <a:r>
-                <a:rPr lang="en-US" baseline="30000" dirty="0" smtClean="0"/>
+                <a:rPr lang="en-US" baseline="30000" dirty="0" smtClean="0">
+                  <a:solidFill>
+                    <a:srgbClr val="595959"/>
+                  </a:solidFill>
+                </a:rPr>
                 <a:t>nd</a:t>
               </a:r>
               <a:r>
-                <a:rPr lang="en-US" dirty="0" smtClean="0"/>
+                <a:rPr lang="en-US" dirty="0" smtClean="0">
+                  <a:solidFill>
+                    <a:srgbClr val="595959"/>
+                  </a:solidFill>
+                </a:rPr>
                 <a:t> PFB</a:t>
               </a:r>
-              <a:endParaRPr lang="en-US" dirty="0"/>
+              <a:endParaRPr lang="en-US" dirty="0">
+                <a:solidFill>
+                  <a:srgbClr val="595959"/>
+                </a:solidFill>
+              </a:endParaRPr>
             </a:p>
           </p:txBody>
         </p:sp>
@@ -7674,10 +8087,18 @@
             <a:p>
               <a:pPr algn="ctr"/>
               <a:r>
-                <a:rPr lang="en-US" dirty="0" smtClean="0"/>
+                <a:rPr lang="en-US" dirty="0" smtClean="0">
+                  <a:solidFill>
+                    <a:srgbClr val="595959"/>
+                  </a:solidFill>
+                </a:rPr>
                 <a:t>Delay &amp; BPASS</a:t>
               </a:r>
-              <a:endParaRPr lang="en-US" dirty="0"/>
+              <a:endParaRPr lang="en-US" dirty="0">
+                <a:solidFill>
+                  <a:srgbClr val="595959"/>
+                </a:solidFill>
+              </a:endParaRPr>
             </a:p>
           </p:txBody>
         </p:sp>
@@ -7731,18 +8152,34 @@
             <a:p>
               <a:pPr algn="ctr"/>
               <a:r>
-                <a:rPr lang="en-US" dirty="0" smtClean="0"/>
+                <a:rPr lang="en-US" dirty="0" smtClean="0">
+                  <a:solidFill>
+                    <a:srgbClr val="595959"/>
+                  </a:solidFill>
+                </a:rPr>
                 <a:t>2</a:t>
               </a:r>
               <a:r>
-                <a:rPr lang="en-US" baseline="30000" dirty="0" smtClean="0"/>
+                <a:rPr lang="en-US" baseline="30000" dirty="0" smtClean="0">
+                  <a:solidFill>
+                    <a:srgbClr val="595959"/>
+                  </a:solidFill>
+                </a:rPr>
                 <a:t>nd</a:t>
               </a:r>
               <a:r>
-                <a:rPr lang="en-US" dirty="0" smtClean="0"/>
+                <a:rPr lang="en-US" dirty="0" smtClean="0">
+                  <a:solidFill>
+                    <a:srgbClr val="595959"/>
+                  </a:solidFill>
+                </a:rPr>
                 <a:t> PFB</a:t>
               </a:r>
-              <a:endParaRPr lang="en-US" dirty="0"/>
+              <a:endParaRPr lang="en-US" dirty="0">
+                <a:solidFill>
+                  <a:srgbClr val="595959"/>
+                </a:solidFill>
+              </a:endParaRPr>
             </a:p>
           </p:txBody>
         </p:sp>
@@ -7781,10 +8218,18 @@
             <a:p>
               <a:pPr algn="ctr"/>
               <a:r>
-                <a:rPr lang="en-US" dirty="0" smtClean="0"/>
+                <a:rPr lang="en-US" dirty="0" smtClean="0">
+                  <a:solidFill>
+                    <a:srgbClr val="595959"/>
+                  </a:solidFill>
+                </a:rPr>
                 <a:t>Delay &amp; BPASS</a:t>
               </a:r>
-              <a:endParaRPr lang="en-US" dirty="0"/>
+              <a:endParaRPr lang="en-US" dirty="0">
+                <a:solidFill>
+                  <a:srgbClr val="595959"/>
+                </a:solidFill>
+              </a:endParaRPr>
             </a:p>
           </p:txBody>
         </p:sp>
@@ -7838,18 +8283,34 @@
             <a:p>
               <a:pPr algn="ctr"/>
               <a:r>
-                <a:rPr lang="en-US" dirty="0" smtClean="0"/>
+                <a:rPr lang="en-US" dirty="0" smtClean="0">
+                  <a:solidFill>
+                    <a:srgbClr val="595959"/>
+                  </a:solidFill>
+                </a:rPr>
                 <a:t>2</a:t>
               </a:r>
               <a:r>
-                <a:rPr lang="en-US" baseline="30000" dirty="0" smtClean="0"/>
+                <a:rPr lang="en-US" baseline="30000" dirty="0" smtClean="0">
+                  <a:solidFill>
+                    <a:srgbClr val="595959"/>
+                  </a:solidFill>
+                </a:rPr>
                 <a:t>nd</a:t>
               </a:r>
               <a:r>
-                <a:rPr lang="en-US" dirty="0" smtClean="0"/>
+                <a:rPr lang="en-US" dirty="0" smtClean="0">
+                  <a:solidFill>
+                    <a:srgbClr val="595959"/>
+                  </a:solidFill>
+                </a:rPr>
                 <a:t> PFB</a:t>
               </a:r>
-              <a:endParaRPr lang="en-US" dirty="0"/>
+              <a:endParaRPr lang="en-US" dirty="0">
+                <a:solidFill>
+                  <a:srgbClr val="595959"/>
+                </a:solidFill>
+              </a:endParaRPr>
             </a:p>
           </p:txBody>
         </p:sp>
@@ -7888,10 +8349,18 @@
             <a:p>
               <a:pPr algn="ctr"/>
               <a:r>
-                <a:rPr lang="en-US" dirty="0" smtClean="0"/>
+                <a:rPr lang="en-US" dirty="0" smtClean="0">
+                  <a:solidFill>
+                    <a:srgbClr val="595959"/>
+                  </a:solidFill>
+                </a:rPr>
                 <a:t>Delay &amp; BPASS</a:t>
               </a:r>
-              <a:endParaRPr lang="en-US" dirty="0"/>
+              <a:endParaRPr lang="en-US" dirty="0">
+                <a:solidFill>
+                  <a:srgbClr val="595959"/>
+                </a:solidFill>
+              </a:endParaRPr>
             </a:p>
           </p:txBody>
         </p:sp>
@@ -7931,10 +8400,18 @@
           <a:p>
             <a:pPr algn="ctr"/>
             <a:r>
-              <a:rPr lang="en-US" dirty="0" smtClean="0"/>
+              <a:rPr lang="en-US" dirty="0" smtClean="0">
+                <a:solidFill>
+                  <a:srgbClr val="595959"/>
+                </a:solidFill>
+              </a:rPr>
               <a:t>XCORR</a:t>
             </a:r>
-            <a:endParaRPr lang="en-US" dirty="0"/>
+            <a:endParaRPr lang="en-US" dirty="0">
+              <a:solidFill>
+                <a:srgbClr val="595959"/>
+              </a:solidFill>
+            </a:endParaRPr>
           </a:p>
         </p:txBody>
       </p:sp>
@@ -8258,66 +8735,16 @@
           </a:fontRef>
         </p:style>
       </p:cxnSp>
-      <p:sp>
-        <p:nvSpPr>
-          <p:cNvPr id="154" name="Rectangle 153"/>
-          <p:cNvSpPr/>
-          <p:nvPr/>
-        </p:nvSpPr>
-        <p:spPr>
-          <a:xfrm>
-            <a:off x="9012496" y="2495674"/>
-            <a:ext cx="791906" cy="1010080"/>
-          </a:xfrm>
-          <a:prstGeom prst="rect">
-            <a:avLst/>
-          </a:prstGeom>
-          <a:solidFill>
-            <a:schemeClr val="bg1">
-              <a:lumMod val="65000"/>
-              <a:alpha val="34000"/>
-            </a:schemeClr>
-          </a:solidFill>
-        </p:spPr>
-        <p:style>
-          <a:lnRef idx="1">
-            <a:schemeClr val="accent1"/>
-          </a:lnRef>
-          <a:fillRef idx="3">
-            <a:schemeClr val="accent1"/>
-          </a:fillRef>
-          <a:effectRef idx="2">
-            <a:schemeClr val="accent1"/>
-          </a:effectRef>
-          <a:fontRef idx="minor">
-            <a:schemeClr val="lt1"/>
-          </a:fontRef>
-        </p:style>
-        <p:txBody>
-          <a:bodyPr rtlCol="0" anchor="ctr"/>
-          <a:lstStyle/>
-          <a:p>
-            <a:pPr algn="ctr"/>
-            <a:r>
-              <a:rPr lang="en-US" dirty="0" smtClean="0"/>
-              <a:t>Corr1</a:t>
-            </a:r>
-            <a:endParaRPr lang="en-US" dirty="0"/>
-          </a:p>
-        </p:txBody>
-      </p:sp>
       <p:cxnSp>
         <p:nvCxnSpPr>
           <p:cNvPr id="27" name="Straight Connector 26"/>
-          <p:cNvCxnSpPr>
-            <a:endCxn id="94" idx="3"/>
-          </p:cNvCxnSpPr>
+          <p:cNvCxnSpPr/>
           <p:nvPr/>
         </p:nvCxnSpPr>
         <p:spPr>
           <a:xfrm flipV="1">
-            <a:off x="4758691" y="2500034"/>
-            <a:ext cx="4347065" cy="1360122"/>
+            <a:off x="4758691" y="2425339"/>
+            <a:ext cx="4592403" cy="1434817"/>
           </a:xfrm>
           <a:prstGeom prst="line">
             <a:avLst/>
@@ -8354,8 +8781,8 @@
         </p:nvCxnSpPr>
         <p:spPr>
           <a:xfrm flipV="1">
-            <a:off x="8860112" y="2495674"/>
-            <a:ext cx="941300" cy="1364481"/>
+            <a:off x="8860112" y="2431152"/>
+            <a:ext cx="930455" cy="1429004"/>
           </a:xfrm>
           <a:prstGeom prst="line">
             <a:avLst/>
@@ -8424,14 +8851,14 @@
       </p:cxnSp>
       <p:sp>
         <p:nvSpPr>
-          <p:cNvPr id="55" name="Rounded Rectangle 54"/>
+          <p:cNvPr id="164" name="Rounded Rectangle 163"/>
           <p:cNvSpPr/>
           <p:nvPr/>
         </p:nvSpPr>
         <p:spPr>
           <a:xfrm>
-            <a:off x="231027" y="487063"/>
-            <a:ext cx="4963163" cy="3373093"/>
+            <a:off x="5494553" y="1067637"/>
+            <a:ext cx="1017453" cy="469334"/>
           </a:xfrm>
           <a:prstGeom prst="roundRect">
             <a:avLst>
@@ -8479,13 +8906,13 @@
       </p:sp>
       <p:sp>
         <p:nvSpPr>
-          <p:cNvPr id="164" name="Rounded Rectangle 163"/>
+          <p:cNvPr id="167" name="Rounded Rectangle 166"/>
           <p:cNvSpPr/>
           <p:nvPr/>
         </p:nvSpPr>
         <p:spPr>
           <a:xfrm>
-            <a:off x="5494553" y="1067637"/>
+            <a:off x="5512484" y="1772854"/>
             <a:ext cx="1017453" cy="469334"/>
           </a:xfrm>
           <a:prstGeom prst="roundRect">
@@ -8534,13 +8961,13 @@
       </p:sp>
       <p:sp>
         <p:nvSpPr>
-          <p:cNvPr id="167" name="Rounded Rectangle 166"/>
+          <p:cNvPr id="168" name="Rounded Rectangle 167"/>
           <p:cNvSpPr/>
           <p:nvPr/>
         </p:nvSpPr>
         <p:spPr>
           <a:xfrm>
-            <a:off x="5512484" y="1772854"/>
+            <a:off x="5515474" y="2358543"/>
             <a:ext cx="1017453" cy="469334"/>
           </a:xfrm>
           <a:prstGeom prst="roundRect">
@@ -8589,13 +9016,13 @@
       </p:sp>
       <p:sp>
         <p:nvSpPr>
-          <p:cNvPr id="168" name="Rounded Rectangle 167"/>
+          <p:cNvPr id="169" name="Rounded Rectangle 168"/>
           <p:cNvSpPr/>
           <p:nvPr/>
         </p:nvSpPr>
         <p:spPr>
           <a:xfrm>
-            <a:off x="5515474" y="2358543"/>
+            <a:off x="5533405" y="3093642"/>
             <a:ext cx="1017453" cy="469334"/>
           </a:xfrm>
           <a:prstGeom prst="roundRect">
@@ -8642,61 +9069,6 @@
           </a:p>
         </p:txBody>
       </p:sp>
-      <p:sp>
-        <p:nvSpPr>
-          <p:cNvPr id="169" name="Rounded Rectangle 168"/>
-          <p:cNvSpPr/>
-          <p:nvPr/>
-        </p:nvSpPr>
-        <p:spPr>
-          <a:xfrm>
-            <a:off x="5533405" y="3093642"/>
-            <a:ext cx="1017453" cy="469334"/>
-          </a:xfrm>
-          <a:prstGeom prst="roundRect">
-            <a:avLst>
-              <a:gd name="adj" fmla="val 10466"/>
-            </a:avLst>
-          </a:prstGeom>
-          <a:solidFill>
-            <a:schemeClr val="accent3">
-              <a:lumMod val="40000"/>
-              <a:lumOff val="60000"/>
-              <a:alpha val="20000"/>
-            </a:schemeClr>
-          </a:solidFill>
-          <a:ln>
-            <a:solidFill>
-              <a:schemeClr val="accent3">
-                <a:lumMod val="75000"/>
-                <a:alpha val="8000"/>
-              </a:schemeClr>
-            </a:solidFill>
-          </a:ln>
-        </p:spPr>
-        <p:style>
-          <a:lnRef idx="1">
-            <a:schemeClr val="accent1"/>
-          </a:lnRef>
-          <a:fillRef idx="3">
-            <a:schemeClr val="accent1"/>
-          </a:fillRef>
-          <a:effectRef idx="2">
-            <a:schemeClr val="accent1"/>
-          </a:effectRef>
-          <a:fontRef idx="minor">
-            <a:schemeClr val="lt1"/>
-          </a:fontRef>
-        </p:style>
-        <p:txBody>
-          <a:bodyPr rtlCol="0" anchor="ctr"/>
-          <a:lstStyle/>
-          <a:p>
-            <a:pPr algn="ctr"/>
-            <a:endParaRPr lang="en-US"/>
-          </a:p>
-        </p:txBody>
-      </p:sp>
       <p:cxnSp>
         <p:nvCxnSpPr>
           <p:cNvPr id="62" name="Straight Arrow Connector 61"/>
@@ -8846,7 +9218,7 @@
             <a:avLst/>
           </a:prstGeom>
           <a:solidFill>
-            <a:schemeClr val="accent6"/>
+            <a:srgbClr val="F0CF43"/>
           </a:solidFill>
         </p:spPr>
         <p:style>
@@ -8869,10 +9241,18 @@
           <a:p>
             <a:pPr algn="ctr"/>
             <a:r>
-              <a:rPr lang="en-US" sz="1400" dirty="0" smtClean="0"/>
+              <a:rPr lang="en-US" sz="1400" dirty="0" smtClean="0">
+                <a:solidFill>
+                  <a:srgbClr val="595959"/>
+                </a:solidFill>
+              </a:rPr>
               <a:t>TRANSPOSE</a:t>
             </a:r>
-            <a:endParaRPr lang="en-US" sz="1400" dirty="0"/>
+            <a:endParaRPr lang="en-US" sz="1400" dirty="0">
+              <a:solidFill>
+                <a:srgbClr val="595959"/>
+              </a:solidFill>
+            </a:endParaRPr>
           </a:p>
         </p:txBody>
       </p:sp>
@@ -9082,8 +9462,8 @@
         </p:nvSpPr>
         <p:spPr>
           <a:xfrm rot="16200000">
-            <a:off x="5019703" y="5108762"/>
-            <a:ext cx="2122621" cy="369332"/>
+            <a:off x="4961206" y="5108762"/>
+            <a:ext cx="2239615" cy="369332"/>
           </a:xfrm>
           <a:prstGeom prst="rect">
             <a:avLst/>
@@ -9142,7 +9522,7 @@
                   <a:srgbClr val="0000FF"/>
                 </a:solidFill>
               </a:rPr>
-              <a:t>[8-15],t]</a:t>
+              <a:t>[16-31],t]</a:t>
             </a:r>
             <a:endParaRPr lang="en-US" dirty="0">
               <a:solidFill>
@@ -9152,6 +9532,92 @@
           </a:p>
         </p:txBody>
       </p:sp>
+      <p:sp>
+        <p:nvSpPr>
+          <p:cNvPr id="199" name="Rectangle 198"/>
+          <p:cNvSpPr/>
+          <p:nvPr/>
+        </p:nvSpPr>
+        <p:spPr>
+          <a:xfrm rot="16200000">
+            <a:off x="9013607" y="2762826"/>
+            <a:ext cx="1117437" cy="442463"/>
+          </a:xfrm>
+          <a:prstGeom prst="rect">
+            <a:avLst/>
+          </a:prstGeom>
+          <a:solidFill>
+            <a:schemeClr val="bg1">
+              <a:lumMod val="65000"/>
+              <a:alpha val="34000"/>
+            </a:schemeClr>
+          </a:solidFill>
+        </p:spPr>
+        <p:style>
+          <a:lnRef idx="1">
+            <a:schemeClr val="accent1"/>
+          </a:lnRef>
+          <a:fillRef idx="3">
+            <a:schemeClr val="accent1"/>
+          </a:fillRef>
+          <a:effectRef idx="2">
+            <a:schemeClr val="accent1"/>
+          </a:effectRef>
+          <a:fontRef idx="minor">
+            <a:schemeClr val="lt1"/>
+          </a:fontRef>
+        </p:style>
+        <p:txBody>
+          <a:bodyPr rtlCol="0" anchor="ctr"/>
+          <a:lstStyle/>
+          <a:p>
+            <a:pPr algn="ctr"/>
+            <a:r>
+              <a:rPr lang="en-US" dirty="0" smtClean="0">
+                <a:solidFill>
+                  <a:srgbClr val="595959"/>
+                </a:solidFill>
+              </a:rPr>
+              <a:t>Corr1</a:t>
+            </a:r>
+            <a:endParaRPr lang="en-US" dirty="0">
+              <a:solidFill>
+                <a:srgbClr val="595959"/>
+              </a:solidFill>
+            </a:endParaRPr>
+          </a:p>
+        </p:txBody>
+      </p:sp>
+      <p:cxnSp>
+        <p:nvCxnSpPr>
+          <p:cNvPr id="202" name="Straight Connector 201"/>
+          <p:cNvCxnSpPr/>
+          <p:nvPr/>
+        </p:nvCxnSpPr>
+        <p:spPr>
+          <a:xfrm flipV="1">
+            <a:off x="8997555" y="3362167"/>
+            <a:ext cx="460210" cy="5377"/>
+          </a:xfrm>
+          <a:prstGeom prst="line">
+            <a:avLst/>
+          </a:prstGeom>
+        </p:spPr>
+        <p:style>
+          <a:lnRef idx="2">
+            <a:schemeClr val="accent1"/>
+          </a:lnRef>
+          <a:fillRef idx="0">
+            <a:schemeClr val="accent1"/>
+          </a:fillRef>
+          <a:effectRef idx="1">
+            <a:schemeClr val="accent1"/>
+          </a:effectRef>
+          <a:fontRef idx="minor">
+            <a:schemeClr val="tx1"/>
+          </a:fontRef>
+        </p:style>
+      </p:cxnSp>
     </p:spTree>
     <p:extLst>
       <p:ext uri="{BB962C8B-B14F-4D97-AF65-F5344CB8AC3E}">

</xml_diff>